<commit_message>
auto build from GitHub Actions
</commit_message>
<xml_diff>
--- a/docs/ace-pro/_downloads/7f7b936ae398bf4d23e6a7724b281688/Aviatrix Logos and Icons.pptx
+++ b/docs/ace-pro/_downloads/7f7b936ae398bf4d23e6a7724b281688/Aviatrix Logos and Icons.pptx
@@ -203,6 +203,22 @@
 <file path=ppt/changesInfos/changesInfo1.xml><?xml version="1.0" encoding="utf-8"?>
 <pc:chgInfo xmlns:a="http://schemas.openxmlformats.org/drawingml/2006/main" xmlns:r="http://schemas.openxmlformats.org/officeDocument/2006/relationships" xmlns:ac="http://schemas.microsoft.com/office/drawing/2013/main/command" xmlns:pc="http://schemas.microsoft.com/office/powerpoint/2013/main/command">
   <pc:docChgLst>
+    <pc:chgData name="Frankie Stroud" userId="c72d88b8-2dd4-4ee5-af3e-1cfd11426328" providerId="ADAL" clId="{41366C87-626C-3A49-96F3-24778FBED23E}"/>
+    <pc:docChg chg="addSld delSld">
+      <pc:chgData name="Frankie Stroud" userId="c72d88b8-2dd4-4ee5-af3e-1cfd11426328" providerId="ADAL" clId="{41366C87-626C-3A49-96F3-24778FBED23E}" dt="2022-02-09T00:26:23.795" v="1" actId="2696"/>
+      <pc:docMkLst>
+        <pc:docMk/>
+      </pc:docMkLst>
+      <pc:sldChg chg="new del">
+        <pc:chgData name="Frankie Stroud" userId="c72d88b8-2dd4-4ee5-af3e-1cfd11426328" providerId="ADAL" clId="{41366C87-626C-3A49-96F3-24778FBED23E}" dt="2022-02-09T00:26:23.795" v="1" actId="2696"/>
+        <pc:sldMkLst>
+          <pc:docMk/>
+          <pc:sldMk cId="203692221" sldId="2385"/>
+        </pc:sldMkLst>
+      </pc:sldChg>
+    </pc:docChg>
+  </pc:docChgLst>
+  <pc:docChgLst>
     <pc:chgData name="Ginny Dudek" userId="787f50d1-3b77-4512-bcfb-ca490ebc47cd" providerId="ADAL" clId="{B807B017-2E00-374E-9591-1E459F32E270}"/>
     <pc:docChg chg="undo custSel modSld delMainMaster modMainMaster">
       <pc:chgData name="Ginny Dudek" userId="787f50d1-3b77-4512-bcfb-ca490ebc47cd" providerId="ADAL" clId="{B807B017-2E00-374E-9591-1E459F32E270}" dt="2022-01-06T19:21:51.458" v="216" actId="20577"/>
@@ -1530,6 +1546,15 @@
     </pc:docChg>
   </pc:docChgLst>
   <pc:docChgLst>
+    <pc:chgData name="Aashish Jolly" userId="e557bdd7-a250-4d09-a910-fd68fcaaf6da" providerId="ADAL" clId="{DA6443C0-4E01-B247-A597-AB3909B5E0E3}"/>
+    <pc:docChg chg="modShowInfo">
+      <pc:chgData name="Aashish Jolly" userId="e557bdd7-a250-4d09-a910-fd68fcaaf6da" providerId="ADAL" clId="{DA6443C0-4E01-B247-A597-AB3909B5E0E3}" dt="2022-05-30T11:27:33.187" v="0" actId="2744"/>
+      <pc:docMkLst>
+        <pc:docMk/>
+      </pc:docMkLst>
+    </pc:docChg>
+  </pc:docChgLst>
+  <pc:docChgLst>
     <pc:chgData name="Umair Hoodbhoy" userId="34e0caed-e379-421f-b010-3b58bd2f404c" providerId="ADAL" clId="{9E62A752-CD42-B241-860A-BD77F190A7A3}"/>
     <pc:docChg chg="undo custSel modSld modMainMaster">
       <pc:chgData name="Umair Hoodbhoy" userId="34e0caed-e379-421f-b010-3b58bd2f404c" providerId="ADAL" clId="{9E62A752-CD42-B241-860A-BD77F190A7A3}" dt="2021-01-01T14:55:22.386" v="17" actId="313"/>
@@ -1806,69 +1831,6 @@
           </ac:spMkLst>
         </pc:spChg>
       </pc:sldMasterChg>
-    </pc:docChg>
-  </pc:docChgLst>
-  <pc:docChgLst>
-    <pc:chgData name="Umair Hoodbhoy" userId="9134fddd-ebe0-41b2-9df4-5549cb596a18" providerId="ADAL" clId="{04D12CB0-48B6-184C-9699-BB15AD0F29F9}"/>
-    <pc:docChg chg="delSld">
-      <pc:chgData name="Umair Hoodbhoy" userId="9134fddd-ebe0-41b2-9df4-5549cb596a18" providerId="ADAL" clId="{04D12CB0-48B6-184C-9699-BB15AD0F29F9}" dt="2021-05-18T21:18:28.453" v="0" actId="2696"/>
-      <pc:docMkLst>
-        <pc:docMk/>
-      </pc:docMkLst>
-      <pc:sldChg chg="del">
-        <pc:chgData name="Umair Hoodbhoy" userId="9134fddd-ebe0-41b2-9df4-5549cb596a18" providerId="ADAL" clId="{04D12CB0-48B6-184C-9699-BB15AD0F29F9}" dt="2021-05-18T21:18:28.453" v="0" actId="2696"/>
-        <pc:sldMkLst>
-          <pc:docMk/>
-          <pc:sldMk cId="1253366361" sldId="2171"/>
-        </pc:sldMkLst>
-      </pc:sldChg>
-    </pc:docChg>
-  </pc:docChgLst>
-  <pc:docChgLst>
-    <pc:chgData name="Umair Hoodbhoy" userId="9134fddd-ebe0-41b2-9df4-5549cb596a18" providerId="ADAL" clId="{4AD4E52A-03E6-094D-AF9C-805F0587F208}"/>
-    <pc:docChg chg="undo custSel modSld">
-      <pc:chgData name="Umair Hoodbhoy" userId="9134fddd-ebe0-41b2-9df4-5549cb596a18" providerId="ADAL" clId="{4AD4E52A-03E6-094D-AF9C-805F0587F208}" dt="2022-07-06T07:23:16.581" v="10" actId="20577"/>
-      <pc:docMkLst>
-        <pc:docMk/>
-      </pc:docMkLst>
-      <pc:sldChg chg="modSp mod">
-        <pc:chgData name="Umair Hoodbhoy" userId="9134fddd-ebe0-41b2-9df4-5549cb596a18" providerId="ADAL" clId="{4AD4E52A-03E6-094D-AF9C-805F0587F208}" dt="2022-07-06T07:23:16.581" v="10" actId="20577"/>
-        <pc:sldMkLst>
-          <pc:docMk/>
-          <pc:sldMk cId="1747856686" sldId="2370"/>
-        </pc:sldMkLst>
-        <pc:graphicFrameChg chg="modGraphic">
-          <ac:chgData name="Umair Hoodbhoy" userId="9134fddd-ebe0-41b2-9df4-5549cb596a18" providerId="ADAL" clId="{4AD4E52A-03E6-094D-AF9C-805F0587F208}" dt="2022-07-06T07:23:16.581" v="10" actId="20577"/>
-          <ac:graphicFrameMkLst>
-            <pc:docMk/>
-            <pc:sldMk cId="1747856686" sldId="2370"/>
-            <ac:graphicFrameMk id="3" creationId="{AE65CB81-BAA6-6540-B52A-31DAC6379A99}"/>
-          </ac:graphicFrameMkLst>
-        </pc:graphicFrameChg>
-      </pc:sldChg>
-      <pc:sldChg chg="modSp mod">
-        <pc:chgData name="Umair Hoodbhoy" userId="9134fddd-ebe0-41b2-9df4-5549cb596a18" providerId="ADAL" clId="{4AD4E52A-03E6-094D-AF9C-805F0587F208}" dt="2022-07-05T02:20:04.150" v="4" actId="1076"/>
-        <pc:sldMkLst>
-          <pc:docMk/>
-          <pc:sldMk cId="2244422166" sldId="2382"/>
-        </pc:sldMkLst>
-        <pc:picChg chg="mod">
-          <ac:chgData name="Umair Hoodbhoy" userId="9134fddd-ebe0-41b2-9df4-5549cb596a18" providerId="ADAL" clId="{4AD4E52A-03E6-094D-AF9C-805F0587F208}" dt="2022-07-05T02:19:59.337" v="3" actId="1076"/>
-          <ac:picMkLst>
-            <pc:docMk/>
-            <pc:sldMk cId="2244422166" sldId="2382"/>
-            <ac:picMk id="29" creationId="{B12CF375-66B9-C746-A51E-AA22930EFF3F}"/>
-          </ac:picMkLst>
-        </pc:picChg>
-        <pc:picChg chg="mod">
-          <ac:chgData name="Umair Hoodbhoy" userId="9134fddd-ebe0-41b2-9df4-5549cb596a18" providerId="ADAL" clId="{4AD4E52A-03E6-094D-AF9C-805F0587F208}" dt="2022-07-05T02:20:04.150" v="4" actId="1076"/>
-          <ac:picMkLst>
-            <pc:docMk/>
-            <pc:sldMk cId="2244422166" sldId="2382"/>
-            <ac:picMk id="30" creationId="{CD94DDD8-DC40-5947-94F2-5C9E1AC4DB55}"/>
-          </ac:picMkLst>
-        </pc:picChg>
-      </pc:sldChg>
     </pc:docChg>
   </pc:docChgLst>
   <pc:docChgLst>
@@ -1997,15 +1959,6 @@
     </pc:docChg>
   </pc:docChgLst>
   <pc:docChgLst>
-    <pc:chgData name="Tomasz Klimczyk" userId="8fae020c-eb24-498a-bfc2-b441c4d5aed8" providerId="ADAL" clId="{9A33C1D5-C28E-7A4E-BB8E-15A549B9C219}"/>
-    <pc:docChg chg="modShowInfo">
-      <pc:chgData name="Tomasz Klimczyk" userId="8fae020c-eb24-498a-bfc2-b441c4d5aed8" providerId="ADAL" clId="{9A33C1D5-C28E-7A4E-BB8E-15A549B9C219}" dt="2020-12-02T17:16:22.668" v="0" actId="2744"/>
-      <pc:docMkLst>
-        <pc:docMk/>
-      </pc:docMkLst>
-    </pc:docChg>
-  </pc:docChgLst>
-  <pc:docChgLst>
     <pc:chgData name="Umair Hoodbhoy" userId="9134fddd-ebe0-41b2-9df4-5549cb596a18" providerId="ADAL" clId="{915036A0-7C0E-F844-AEF1-351436E1FEB8}"/>
     <pc:docChg chg="custSel addSld delSld modSld sldOrd">
       <pc:chgData name="Umair Hoodbhoy" userId="9134fddd-ebe0-41b2-9df4-5549cb596a18" providerId="ADAL" clId="{915036A0-7C0E-F844-AEF1-351436E1FEB8}" dt="2022-08-09T20:40:01.009" v="53" actId="2696"/>
@@ -2462,671 +2415,56 @@
     </pc:docChg>
   </pc:docChgLst>
   <pc:docChgLst>
-    <pc:chgData name="Nicolas Delecroix" userId="9aea8ee3-214f-409e-bcc8-e981c3ad58f1" providerId="ADAL" clId="{AA833F7C-A8CB-B84C-99BE-3BE235C17BFC}"/>
-    <pc:docChg chg="custSel modSld">
-      <pc:chgData name="Nicolas Delecroix" userId="9aea8ee3-214f-409e-bcc8-e981c3ad58f1" providerId="ADAL" clId="{AA833F7C-A8CB-B84C-99BE-3BE235C17BFC}" dt="2020-06-24T22:11:44.257" v="0" actId="478"/>
+    <pc:chgData name="Umair Hoodbhoy" userId="9134fddd-ebe0-41b2-9df4-5549cb596a18" providerId="ADAL" clId="{4AD4E52A-03E6-094D-AF9C-805F0587F208}"/>
+    <pc:docChg chg="undo custSel modSld">
+      <pc:chgData name="Umair Hoodbhoy" userId="9134fddd-ebe0-41b2-9df4-5549cb596a18" providerId="ADAL" clId="{4AD4E52A-03E6-094D-AF9C-805F0587F208}" dt="2022-07-06T07:23:16.581" v="10" actId="20577"/>
       <pc:docMkLst>
         <pc:docMk/>
       </pc:docMkLst>
-      <pc:sldChg chg="delSp">
-        <pc:chgData name="Nicolas Delecroix" userId="9aea8ee3-214f-409e-bcc8-e981c3ad58f1" providerId="ADAL" clId="{AA833F7C-A8CB-B84C-99BE-3BE235C17BFC}" dt="2020-06-24T22:11:44.257" v="0" actId="478"/>
+      <pc:sldChg chg="modSp mod">
+        <pc:chgData name="Umair Hoodbhoy" userId="9134fddd-ebe0-41b2-9df4-5549cb596a18" providerId="ADAL" clId="{4AD4E52A-03E6-094D-AF9C-805F0587F208}" dt="2022-07-06T07:23:16.581" v="10" actId="20577"/>
         <pc:sldMkLst>
           <pc:docMk/>
-          <pc:sldMk cId="1323792454" sldId="2199"/>
+          <pc:sldMk cId="1747856686" sldId="2370"/>
         </pc:sldMkLst>
-        <pc:spChg chg="del">
-          <ac:chgData name="Nicolas Delecroix" userId="9aea8ee3-214f-409e-bcc8-e981c3ad58f1" providerId="ADAL" clId="{AA833F7C-A8CB-B84C-99BE-3BE235C17BFC}" dt="2020-06-24T22:11:44.257" v="0" actId="478"/>
-          <ac:spMkLst>
-            <pc:docMk/>
-            <pc:sldMk cId="1323792454" sldId="2199"/>
-            <ac:spMk id="7" creationId="{DCA7D4D2-BF23-E74C-A8CD-D9A8FE709994}"/>
-          </ac:spMkLst>
-        </pc:spChg>
+        <pc:graphicFrameChg chg="modGraphic">
+          <ac:chgData name="Umair Hoodbhoy" userId="9134fddd-ebe0-41b2-9df4-5549cb596a18" providerId="ADAL" clId="{4AD4E52A-03E6-094D-AF9C-805F0587F208}" dt="2022-07-06T07:23:16.581" v="10" actId="20577"/>
+          <ac:graphicFrameMkLst>
+            <pc:docMk/>
+            <pc:sldMk cId="1747856686" sldId="2370"/>
+            <ac:graphicFrameMk id="3" creationId="{AE65CB81-BAA6-6540-B52A-31DAC6379A99}"/>
+          </ac:graphicFrameMkLst>
+        </pc:graphicFrameChg>
+      </pc:sldChg>
+      <pc:sldChg chg="modSp mod">
+        <pc:chgData name="Umair Hoodbhoy" userId="9134fddd-ebe0-41b2-9df4-5549cb596a18" providerId="ADAL" clId="{4AD4E52A-03E6-094D-AF9C-805F0587F208}" dt="2022-07-05T02:20:04.150" v="4" actId="1076"/>
+        <pc:sldMkLst>
+          <pc:docMk/>
+          <pc:sldMk cId="2244422166" sldId="2382"/>
+        </pc:sldMkLst>
+        <pc:picChg chg="mod">
+          <ac:chgData name="Umair Hoodbhoy" userId="9134fddd-ebe0-41b2-9df4-5549cb596a18" providerId="ADAL" clId="{4AD4E52A-03E6-094D-AF9C-805F0587F208}" dt="2022-07-05T02:19:59.337" v="3" actId="1076"/>
+          <ac:picMkLst>
+            <pc:docMk/>
+            <pc:sldMk cId="2244422166" sldId="2382"/>
+            <ac:picMk id="29" creationId="{B12CF375-66B9-C746-A51E-AA22930EFF3F}"/>
+          </ac:picMkLst>
+        </pc:picChg>
+        <pc:picChg chg="mod">
+          <ac:chgData name="Umair Hoodbhoy" userId="9134fddd-ebe0-41b2-9df4-5549cb596a18" providerId="ADAL" clId="{4AD4E52A-03E6-094D-AF9C-805F0587F208}" dt="2022-07-05T02:20:04.150" v="4" actId="1076"/>
+          <ac:picMkLst>
+            <pc:docMk/>
+            <pc:sldMk cId="2244422166" sldId="2382"/>
+            <ac:picMk id="30" creationId="{CD94DDD8-DC40-5947-94F2-5C9E1AC4DB55}"/>
+          </ac:picMkLst>
+        </pc:picChg>
       </pc:sldChg>
     </pc:docChg>
   </pc:docChgLst>
   <pc:docChgLst>
-    <pc:chgData name="Umair Hoodbhoy" userId="9134fddd-ebe0-41b2-9df4-5549cb596a18" providerId="ADAL" clId="{4748566E-7703-B448-B4C4-CCEEE3A860AE}"/>
-    <pc:docChg chg="undo custSel addSld delSld modSld delMainMaster">
-      <pc:chgData name="Umair Hoodbhoy" userId="9134fddd-ebe0-41b2-9df4-5549cb596a18" providerId="ADAL" clId="{4748566E-7703-B448-B4C4-CCEEE3A860AE}" dt="2021-08-10T17:57:56.365" v="204" actId="2696"/>
-      <pc:docMkLst>
-        <pc:docMk/>
-      </pc:docMkLst>
-      <pc:sldChg chg="addSp modSp mod modClrScheme chgLayout">
-        <pc:chgData name="Umair Hoodbhoy" userId="9134fddd-ebe0-41b2-9df4-5549cb596a18" providerId="ADAL" clId="{4748566E-7703-B448-B4C4-CCEEE3A860AE}" dt="2021-08-10T17:57:10.836" v="184" actId="20577"/>
-        <pc:sldMkLst>
-          <pc:docMk/>
-          <pc:sldMk cId="2628666855" sldId="2035"/>
-        </pc:sldMkLst>
-        <pc:spChg chg="add mod ord">
-          <ac:chgData name="Umair Hoodbhoy" userId="9134fddd-ebe0-41b2-9df4-5549cb596a18" providerId="ADAL" clId="{4748566E-7703-B448-B4C4-CCEEE3A860AE}" dt="2021-08-10T17:57:00.360" v="175" actId="700"/>
-          <ac:spMkLst>
-            <pc:docMk/>
-            <pc:sldMk cId="2628666855" sldId="2035"/>
-            <ac:spMk id="2" creationId="{496F1C75-340C-CD4E-9D44-90E650783231}"/>
-          </ac:spMkLst>
-        </pc:spChg>
-        <pc:spChg chg="add mod ord">
-          <ac:chgData name="Umair Hoodbhoy" userId="9134fddd-ebe0-41b2-9df4-5549cb596a18" providerId="ADAL" clId="{4748566E-7703-B448-B4C4-CCEEE3A860AE}" dt="2021-08-10T17:57:00.360" v="175" actId="700"/>
-          <ac:spMkLst>
-            <pc:docMk/>
-            <pc:sldMk cId="2628666855" sldId="2035"/>
-            <ac:spMk id="3" creationId="{E5BACD7D-FD55-EA45-9031-67F36E87E081}"/>
-          </ac:spMkLst>
-        </pc:spChg>
-        <pc:spChg chg="mod ord">
-          <ac:chgData name="Umair Hoodbhoy" userId="9134fddd-ebe0-41b2-9df4-5549cb596a18" providerId="ADAL" clId="{4748566E-7703-B448-B4C4-CCEEE3A860AE}" dt="2021-08-10T17:57:10.836" v="184" actId="20577"/>
-          <ac:spMkLst>
-            <pc:docMk/>
-            <pc:sldMk cId="2628666855" sldId="2035"/>
-            <ac:spMk id="4" creationId="{E87735F1-603B-3041-BABB-205BB8D0A30E}"/>
-          </ac:spMkLst>
-        </pc:spChg>
-        <pc:spChg chg="add mod ord">
-          <ac:chgData name="Umair Hoodbhoy" userId="9134fddd-ebe0-41b2-9df4-5549cb596a18" providerId="ADAL" clId="{4748566E-7703-B448-B4C4-CCEEE3A860AE}" dt="2021-08-10T17:57:00.360" v="175" actId="700"/>
-          <ac:spMkLst>
-            <pc:docMk/>
-            <pc:sldMk cId="2628666855" sldId="2035"/>
-            <ac:spMk id="5" creationId="{86262720-CE1C-6146-A606-2368BB71E25C}"/>
-          </ac:spMkLst>
-        </pc:spChg>
-        <pc:spChg chg="add mod ord">
-          <ac:chgData name="Umair Hoodbhoy" userId="9134fddd-ebe0-41b2-9df4-5549cb596a18" providerId="ADAL" clId="{4748566E-7703-B448-B4C4-CCEEE3A860AE}" dt="2021-08-10T17:57:00.360" v="175" actId="700"/>
-          <ac:spMkLst>
-            <pc:docMk/>
-            <pc:sldMk cId="2628666855" sldId="2035"/>
-            <ac:spMk id="6" creationId="{61CA4AF6-B2A5-054F-BEDD-5BE771BC700C}"/>
-          </ac:spMkLst>
-        </pc:spChg>
-      </pc:sldChg>
-      <pc:sldChg chg="del">
-        <pc:chgData name="Umair Hoodbhoy" userId="9134fddd-ebe0-41b2-9df4-5549cb596a18" providerId="ADAL" clId="{4748566E-7703-B448-B4C4-CCEEE3A860AE}" dt="2021-08-10T17:57:45.131" v="199" actId="2696"/>
-        <pc:sldMkLst>
-          <pc:docMk/>
-          <pc:sldMk cId="1323792454" sldId="2199"/>
-        </pc:sldMkLst>
-      </pc:sldChg>
-      <pc:sldChg chg="modSp mod modClrScheme chgLayout">
-        <pc:chgData name="Umair Hoodbhoy" userId="9134fddd-ebe0-41b2-9df4-5549cb596a18" providerId="ADAL" clId="{4748566E-7703-B448-B4C4-CCEEE3A860AE}" dt="2021-08-10T17:53:21.286" v="46" actId="1076"/>
-        <pc:sldMkLst>
-          <pc:docMk/>
-          <pc:sldMk cId="2103512187" sldId="2225"/>
-        </pc:sldMkLst>
-        <pc:spChg chg="mod ord">
-          <ac:chgData name="Umair Hoodbhoy" userId="9134fddd-ebe0-41b2-9df4-5549cb596a18" providerId="ADAL" clId="{4748566E-7703-B448-B4C4-CCEEE3A860AE}" dt="2021-08-10T17:52:32.459" v="37" actId="27636"/>
-          <ac:spMkLst>
-            <pc:docMk/>
-            <pc:sldMk cId="2103512187" sldId="2225"/>
-            <ac:spMk id="2" creationId="{00000000-0000-0000-0000-000000000000}"/>
-          </ac:spMkLst>
-        </pc:spChg>
-        <pc:spChg chg="mod">
-          <ac:chgData name="Umair Hoodbhoy" userId="9134fddd-ebe0-41b2-9df4-5549cb596a18" providerId="ADAL" clId="{4748566E-7703-B448-B4C4-CCEEE3A860AE}" dt="2021-08-10T17:52:40.174" v="38" actId="1076"/>
-          <ac:spMkLst>
-            <pc:docMk/>
-            <pc:sldMk cId="2103512187" sldId="2225"/>
-            <ac:spMk id="3" creationId="{03FAE4DA-8F0C-454A-AEDB-BDBEB38A1909}"/>
-          </ac:spMkLst>
-        </pc:spChg>
-        <pc:spChg chg="mod">
-          <ac:chgData name="Umair Hoodbhoy" userId="9134fddd-ebe0-41b2-9df4-5549cb596a18" providerId="ADAL" clId="{4748566E-7703-B448-B4C4-CCEEE3A860AE}" dt="2021-08-10T17:53:21.286" v="46" actId="1076"/>
-          <ac:spMkLst>
-            <pc:docMk/>
-            <pc:sldMk cId="2103512187" sldId="2225"/>
-            <ac:spMk id="4" creationId="{1F6A7559-F12D-2247-9846-17AAB21467A1}"/>
-          </ac:spMkLst>
-        </pc:spChg>
-        <pc:spChg chg="mod">
-          <ac:chgData name="Umair Hoodbhoy" userId="9134fddd-ebe0-41b2-9df4-5549cb596a18" providerId="ADAL" clId="{4748566E-7703-B448-B4C4-CCEEE3A860AE}" dt="2021-08-10T17:53:10.470" v="44" actId="1076"/>
-          <ac:spMkLst>
-            <pc:docMk/>
-            <pc:sldMk cId="2103512187" sldId="2225"/>
-            <ac:spMk id="90" creationId="{76B8B6F4-E593-4E4A-A308-94373D8EDB31}"/>
-          </ac:spMkLst>
-        </pc:spChg>
-        <pc:spChg chg="mod">
-          <ac:chgData name="Umair Hoodbhoy" userId="9134fddd-ebe0-41b2-9df4-5549cb596a18" providerId="ADAL" clId="{4748566E-7703-B448-B4C4-CCEEE3A860AE}" dt="2021-08-10T17:53:10.470" v="44" actId="1076"/>
-          <ac:spMkLst>
-            <pc:docMk/>
-            <pc:sldMk cId="2103512187" sldId="2225"/>
-            <ac:spMk id="91" creationId="{F128FAAD-BB95-5B40-8084-BDA3DC3275DD}"/>
-          </ac:spMkLst>
-        </pc:spChg>
-        <pc:spChg chg="mod">
-          <ac:chgData name="Umair Hoodbhoy" userId="9134fddd-ebe0-41b2-9df4-5549cb596a18" providerId="ADAL" clId="{4748566E-7703-B448-B4C4-CCEEE3A860AE}" dt="2021-08-10T17:53:10.470" v="44" actId="1076"/>
-          <ac:spMkLst>
-            <pc:docMk/>
-            <pc:sldMk cId="2103512187" sldId="2225"/>
-            <ac:spMk id="92" creationId="{8C85B914-B9D2-DE4C-9B3D-5D04B370B046}"/>
-          </ac:spMkLst>
-        </pc:spChg>
-        <pc:spChg chg="mod">
-          <ac:chgData name="Umair Hoodbhoy" userId="9134fddd-ebe0-41b2-9df4-5549cb596a18" providerId="ADAL" clId="{4748566E-7703-B448-B4C4-CCEEE3A860AE}" dt="2021-08-10T17:53:10.470" v="44" actId="1076"/>
-          <ac:spMkLst>
-            <pc:docMk/>
-            <pc:sldMk cId="2103512187" sldId="2225"/>
-            <ac:spMk id="94" creationId="{0A6F1F27-8CD1-E645-93CC-A929B156A531}"/>
-          </ac:spMkLst>
-        </pc:spChg>
-        <pc:spChg chg="mod">
-          <ac:chgData name="Umair Hoodbhoy" userId="9134fddd-ebe0-41b2-9df4-5549cb596a18" providerId="ADAL" clId="{4748566E-7703-B448-B4C4-CCEEE3A860AE}" dt="2021-08-10T17:53:10.470" v="44" actId="1076"/>
-          <ac:spMkLst>
-            <pc:docMk/>
-            <pc:sldMk cId="2103512187" sldId="2225"/>
-            <ac:spMk id="96" creationId="{BB7BA867-946E-9B49-8D54-D4EEC1D68CD4}"/>
-          </ac:spMkLst>
-        </pc:spChg>
-        <pc:spChg chg="mod">
-          <ac:chgData name="Umair Hoodbhoy" userId="9134fddd-ebe0-41b2-9df4-5549cb596a18" providerId="ADAL" clId="{4748566E-7703-B448-B4C4-CCEEE3A860AE}" dt="2021-08-10T17:52:57.308" v="42" actId="1076"/>
-          <ac:spMkLst>
-            <pc:docMk/>
-            <pc:sldMk cId="2103512187" sldId="2225"/>
-            <ac:spMk id="100" creationId="{C99C00EB-C846-B143-B7E0-183B7B4CFF4C}"/>
-          </ac:spMkLst>
-        </pc:spChg>
-        <pc:spChg chg="mod">
-          <ac:chgData name="Umair Hoodbhoy" userId="9134fddd-ebe0-41b2-9df4-5549cb596a18" providerId="ADAL" clId="{4748566E-7703-B448-B4C4-CCEEE3A860AE}" dt="2021-08-10T17:52:48.067" v="40" actId="14100"/>
-          <ac:spMkLst>
-            <pc:docMk/>
-            <pc:sldMk cId="2103512187" sldId="2225"/>
-            <ac:spMk id="105" creationId="{483A1C07-5F29-DC4C-889A-C93106362F92}"/>
-          </ac:spMkLst>
-        </pc:spChg>
-        <pc:spChg chg="mod">
-          <ac:chgData name="Umair Hoodbhoy" userId="9134fddd-ebe0-41b2-9df4-5549cb596a18" providerId="ADAL" clId="{4748566E-7703-B448-B4C4-CCEEE3A860AE}" dt="2021-08-10T17:53:10.470" v="44" actId="1076"/>
-          <ac:spMkLst>
-            <pc:docMk/>
-            <pc:sldMk cId="2103512187" sldId="2225"/>
-            <ac:spMk id="106" creationId="{26AADCF0-997A-5E47-9A49-4C90A0C184D3}"/>
-          </ac:spMkLst>
-        </pc:spChg>
-        <pc:spChg chg="mod">
-          <ac:chgData name="Umair Hoodbhoy" userId="9134fddd-ebe0-41b2-9df4-5549cb596a18" providerId="ADAL" clId="{4748566E-7703-B448-B4C4-CCEEE3A860AE}" dt="2021-08-10T17:53:10.470" v="44" actId="1076"/>
-          <ac:spMkLst>
-            <pc:docMk/>
-            <pc:sldMk cId="2103512187" sldId="2225"/>
-            <ac:spMk id="107" creationId="{9B8DB198-32F7-544B-BF32-414A02D43B93}"/>
-          </ac:spMkLst>
-        </pc:spChg>
-        <pc:spChg chg="mod">
-          <ac:chgData name="Umair Hoodbhoy" userId="9134fddd-ebe0-41b2-9df4-5549cb596a18" providerId="ADAL" clId="{4748566E-7703-B448-B4C4-CCEEE3A860AE}" dt="2021-08-10T17:53:10.470" v="44" actId="1076"/>
-          <ac:spMkLst>
-            <pc:docMk/>
-            <pc:sldMk cId="2103512187" sldId="2225"/>
-            <ac:spMk id="108" creationId="{BA7757C3-48A7-1C4C-8BDC-3E290DCFD8C7}"/>
-          </ac:spMkLst>
-        </pc:spChg>
-        <pc:spChg chg="mod">
-          <ac:chgData name="Umair Hoodbhoy" userId="9134fddd-ebe0-41b2-9df4-5549cb596a18" providerId="ADAL" clId="{4748566E-7703-B448-B4C4-CCEEE3A860AE}" dt="2021-08-10T17:53:10.470" v="44" actId="1076"/>
-          <ac:spMkLst>
-            <pc:docMk/>
-            <pc:sldMk cId="2103512187" sldId="2225"/>
-            <ac:spMk id="109" creationId="{AAE53226-1C00-EA43-B5A1-3D5796A3F06A}"/>
-          </ac:spMkLst>
-        </pc:spChg>
-        <pc:spChg chg="mod">
-          <ac:chgData name="Umair Hoodbhoy" userId="9134fddd-ebe0-41b2-9df4-5549cb596a18" providerId="ADAL" clId="{4748566E-7703-B448-B4C4-CCEEE3A860AE}" dt="2021-08-10T17:53:10.470" v="44" actId="1076"/>
-          <ac:spMkLst>
-            <pc:docMk/>
-            <pc:sldMk cId="2103512187" sldId="2225"/>
-            <ac:spMk id="110" creationId="{C5785B33-50C7-5D44-8FA9-5EB084335B71}"/>
-          </ac:spMkLst>
-        </pc:spChg>
-        <pc:spChg chg="mod">
-          <ac:chgData name="Umair Hoodbhoy" userId="9134fddd-ebe0-41b2-9df4-5549cb596a18" providerId="ADAL" clId="{4748566E-7703-B448-B4C4-CCEEE3A860AE}" dt="2021-08-10T17:53:10.470" v="44" actId="1076"/>
-          <ac:spMkLst>
-            <pc:docMk/>
-            <pc:sldMk cId="2103512187" sldId="2225"/>
-            <ac:spMk id="111" creationId="{654B31B9-FC86-444D-852B-3C2BCF179086}"/>
-          </ac:spMkLst>
-        </pc:spChg>
-        <pc:spChg chg="mod">
-          <ac:chgData name="Umair Hoodbhoy" userId="9134fddd-ebe0-41b2-9df4-5549cb596a18" providerId="ADAL" clId="{4748566E-7703-B448-B4C4-CCEEE3A860AE}" dt="2021-08-10T17:53:10.470" v="44" actId="1076"/>
-          <ac:spMkLst>
-            <pc:docMk/>
-            <pc:sldMk cId="2103512187" sldId="2225"/>
-            <ac:spMk id="112" creationId="{9CA40433-8D8A-9841-A471-F69205EEF198}"/>
-          </ac:spMkLst>
-        </pc:spChg>
-        <pc:spChg chg="mod">
-          <ac:chgData name="Umair Hoodbhoy" userId="9134fddd-ebe0-41b2-9df4-5549cb596a18" providerId="ADAL" clId="{4748566E-7703-B448-B4C4-CCEEE3A860AE}" dt="2021-08-10T17:53:10.470" v="44" actId="1076"/>
-          <ac:spMkLst>
-            <pc:docMk/>
-            <pc:sldMk cId="2103512187" sldId="2225"/>
-            <ac:spMk id="113" creationId="{DE07D109-6FC2-A541-8342-BBFAE1F6C5CC}"/>
-          </ac:spMkLst>
-        </pc:spChg>
-        <pc:spChg chg="mod">
-          <ac:chgData name="Umair Hoodbhoy" userId="9134fddd-ebe0-41b2-9df4-5549cb596a18" providerId="ADAL" clId="{4748566E-7703-B448-B4C4-CCEEE3A860AE}" dt="2021-08-10T17:53:10.470" v="44" actId="1076"/>
-          <ac:spMkLst>
-            <pc:docMk/>
-            <pc:sldMk cId="2103512187" sldId="2225"/>
-            <ac:spMk id="114" creationId="{85898ACB-E6B6-D742-90A8-8FF6AF967660}"/>
-          </ac:spMkLst>
-        </pc:spChg>
-        <pc:spChg chg="mod">
-          <ac:chgData name="Umair Hoodbhoy" userId="9134fddd-ebe0-41b2-9df4-5549cb596a18" providerId="ADAL" clId="{4748566E-7703-B448-B4C4-CCEEE3A860AE}" dt="2021-08-10T17:53:10.470" v="44" actId="1076"/>
-          <ac:spMkLst>
-            <pc:docMk/>
-            <pc:sldMk cId="2103512187" sldId="2225"/>
-            <ac:spMk id="115" creationId="{F61538D8-912C-5847-A893-E94A82D9A2B2}"/>
-          </ac:spMkLst>
-        </pc:spChg>
-        <pc:spChg chg="mod">
-          <ac:chgData name="Umair Hoodbhoy" userId="9134fddd-ebe0-41b2-9df4-5549cb596a18" providerId="ADAL" clId="{4748566E-7703-B448-B4C4-CCEEE3A860AE}" dt="2021-08-10T17:53:10.470" v="44" actId="1076"/>
-          <ac:spMkLst>
-            <pc:docMk/>
-            <pc:sldMk cId="2103512187" sldId="2225"/>
-            <ac:spMk id="116" creationId="{992E6830-C72D-8543-9B20-8E9CDD751F59}"/>
-          </ac:spMkLst>
-        </pc:spChg>
-        <pc:spChg chg="mod">
-          <ac:chgData name="Umair Hoodbhoy" userId="9134fddd-ebe0-41b2-9df4-5549cb596a18" providerId="ADAL" clId="{4748566E-7703-B448-B4C4-CCEEE3A860AE}" dt="2021-08-10T17:53:10.470" v="44" actId="1076"/>
-          <ac:spMkLst>
-            <pc:docMk/>
-            <pc:sldMk cId="2103512187" sldId="2225"/>
-            <ac:spMk id="117" creationId="{8205DA29-FB5C-E04B-87F0-D1247D7C47D7}"/>
-          </ac:spMkLst>
-        </pc:spChg>
-        <pc:spChg chg="mod">
-          <ac:chgData name="Umair Hoodbhoy" userId="9134fddd-ebe0-41b2-9df4-5549cb596a18" providerId="ADAL" clId="{4748566E-7703-B448-B4C4-CCEEE3A860AE}" dt="2021-08-10T17:53:10.470" v="44" actId="1076"/>
-          <ac:spMkLst>
-            <pc:docMk/>
-            <pc:sldMk cId="2103512187" sldId="2225"/>
-            <ac:spMk id="118" creationId="{176379BC-6157-7842-840C-932EA9FBD1F7}"/>
-          </ac:spMkLst>
-        </pc:spChg>
-        <pc:spChg chg="mod">
-          <ac:chgData name="Umair Hoodbhoy" userId="9134fddd-ebe0-41b2-9df4-5549cb596a18" providerId="ADAL" clId="{4748566E-7703-B448-B4C4-CCEEE3A860AE}" dt="2021-08-10T17:53:01.437" v="43" actId="14100"/>
-          <ac:spMkLst>
-            <pc:docMk/>
-            <pc:sldMk cId="2103512187" sldId="2225"/>
-            <ac:spMk id="127" creationId="{0E9D4DE5-8621-A445-BF6D-0111E488092A}"/>
-          </ac:spMkLst>
-        </pc:spChg>
-        <pc:cxnChg chg="mod">
-          <ac:chgData name="Umair Hoodbhoy" userId="9134fddd-ebe0-41b2-9df4-5549cb596a18" providerId="ADAL" clId="{4748566E-7703-B448-B4C4-CCEEE3A860AE}" dt="2021-08-10T17:53:10.470" v="44" actId="1076"/>
-          <ac:cxnSpMkLst>
-            <pc:docMk/>
-            <pc:sldMk cId="2103512187" sldId="2225"/>
-            <ac:cxnSpMk id="84" creationId="{84CCA56B-746F-264E-B03F-0F7DCA4C2D1E}"/>
-          </ac:cxnSpMkLst>
-        </pc:cxnChg>
-        <pc:cxnChg chg="mod">
-          <ac:chgData name="Umair Hoodbhoy" userId="9134fddd-ebe0-41b2-9df4-5549cb596a18" providerId="ADAL" clId="{4748566E-7703-B448-B4C4-CCEEE3A860AE}" dt="2021-08-10T17:53:10.470" v="44" actId="1076"/>
-          <ac:cxnSpMkLst>
-            <pc:docMk/>
-            <pc:sldMk cId="2103512187" sldId="2225"/>
-            <ac:cxnSpMk id="85" creationId="{961AC784-FFF7-1C4A-9A5A-C5B397B0DD66}"/>
-          </ac:cxnSpMkLst>
-        </pc:cxnChg>
-        <pc:cxnChg chg="mod">
-          <ac:chgData name="Umair Hoodbhoy" userId="9134fddd-ebe0-41b2-9df4-5549cb596a18" providerId="ADAL" clId="{4748566E-7703-B448-B4C4-CCEEE3A860AE}" dt="2021-08-10T17:53:10.470" v="44" actId="1076"/>
-          <ac:cxnSpMkLst>
-            <pc:docMk/>
-            <pc:sldMk cId="2103512187" sldId="2225"/>
-            <ac:cxnSpMk id="86" creationId="{158C606F-AFC0-8F4D-9599-A5AE24930BD2}"/>
-          </ac:cxnSpMkLst>
-        </pc:cxnChg>
-        <pc:cxnChg chg="mod">
-          <ac:chgData name="Umair Hoodbhoy" userId="9134fddd-ebe0-41b2-9df4-5549cb596a18" providerId="ADAL" clId="{4748566E-7703-B448-B4C4-CCEEE3A860AE}" dt="2021-08-10T17:53:10.470" v="44" actId="1076"/>
-          <ac:cxnSpMkLst>
-            <pc:docMk/>
-            <pc:sldMk cId="2103512187" sldId="2225"/>
-            <ac:cxnSpMk id="87" creationId="{9E58FBBA-FB66-1640-ABA0-2B2D04D93218}"/>
-          </ac:cxnSpMkLst>
-        </pc:cxnChg>
-        <pc:cxnChg chg="mod">
-          <ac:chgData name="Umair Hoodbhoy" userId="9134fddd-ebe0-41b2-9df4-5549cb596a18" providerId="ADAL" clId="{4748566E-7703-B448-B4C4-CCEEE3A860AE}" dt="2021-08-10T17:53:10.470" v="44" actId="1076"/>
-          <ac:cxnSpMkLst>
-            <pc:docMk/>
-            <pc:sldMk cId="2103512187" sldId="2225"/>
-            <ac:cxnSpMk id="88" creationId="{FF69ECFF-088B-7A40-A7DA-5F46CF15E6A3}"/>
-          </ac:cxnSpMkLst>
-        </pc:cxnChg>
-        <pc:cxnChg chg="mod">
-          <ac:chgData name="Umair Hoodbhoy" userId="9134fddd-ebe0-41b2-9df4-5549cb596a18" providerId="ADAL" clId="{4748566E-7703-B448-B4C4-CCEEE3A860AE}" dt="2021-08-10T17:53:10.470" v="44" actId="1076"/>
-          <ac:cxnSpMkLst>
-            <pc:docMk/>
-            <pc:sldMk cId="2103512187" sldId="2225"/>
-            <ac:cxnSpMk id="119" creationId="{CD0786B7-6AD0-2049-9214-EF24E444E541}"/>
-          </ac:cxnSpMkLst>
-        </pc:cxnChg>
-        <pc:cxnChg chg="mod">
-          <ac:chgData name="Umair Hoodbhoy" userId="9134fddd-ebe0-41b2-9df4-5549cb596a18" providerId="ADAL" clId="{4748566E-7703-B448-B4C4-CCEEE3A860AE}" dt="2021-08-10T17:53:10.470" v="44" actId="1076"/>
-          <ac:cxnSpMkLst>
-            <pc:docMk/>
-            <pc:sldMk cId="2103512187" sldId="2225"/>
-            <ac:cxnSpMk id="120" creationId="{F8427C67-C6D7-BC46-A3EA-72A3E5CA25EE}"/>
-          </ac:cxnSpMkLst>
-        </pc:cxnChg>
-        <pc:cxnChg chg="mod">
-          <ac:chgData name="Umair Hoodbhoy" userId="9134fddd-ebe0-41b2-9df4-5549cb596a18" providerId="ADAL" clId="{4748566E-7703-B448-B4C4-CCEEE3A860AE}" dt="2021-08-10T17:53:10.470" v="44" actId="1076"/>
-          <ac:cxnSpMkLst>
-            <pc:docMk/>
-            <pc:sldMk cId="2103512187" sldId="2225"/>
-            <ac:cxnSpMk id="121" creationId="{FF06D8CD-3D87-074E-B03E-E231F05FF55F}"/>
-          </ac:cxnSpMkLst>
-        </pc:cxnChg>
-        <pc:cxnChg chg="mod">
-          <ac:chgData name="Umair Hoodbhoy" userId="9134fddd-ebe0-41b2-9df4-5549cb596a18" providerId="ADAL" clId="{4748566E-7703-B448-B4C4-CCEEE3A860AE}" dt="2021-08-10T17:53:10.470" v="44" actId="1076"/>
-          <ac:cxnSpMkLst>
-            <pc:docMk/>
-            <pc:sldMk cId="2103512187" sldId="2225"/>
-            <ac:cxnSpMk id="122" creationId="{C50FEAAD-46B8-704F-B179-1DEDAEE24D28}"/>
-          </ac:cxnSpMkLst>
-        </pc:cxnChg>
-        <pc:cxnChg chg="mod">
-          <ac:chgData name="Umair Hoodbhoy" userId="9134fddd-ebe0-41b2-9df4-5549cb596a18" providerId="ADAL" clId="{4748566E-7703-B448-B4C4-CCEEE3A860AE}" dt="2021-08-10T17:53:10.470" v="44" actId="1076"/>
-          <ac:cxnSpMkLst>
-            <pc:docMk/>
-            <pc:sldMk cId="2103512187" sldId="2225"/>
-            <ac:cxnSpMk id="123" creationId="{C2A5BDED-E809-974F-BA17-2BB4BE03A1FC}"/>
-          </ac:cxnSpMkLst>
-        </pc:cxnChg>
-      </pc:sldChg>
-      <pc:sldChg chg="delSp modSp mod modClrScheme chgLayout">
-        <pc:chgData name="Umair Hoodbhoy" userId="9134fddd-ebe0-41b2-9df4-5549cb596a18" providerId="ADAL" clId="{4748566E-7703-B448-B4C4-CCEEE3A860AE}" dt="2021-08-10T17:54:10.309" v="67" actId="20577"/>
-        <pc:sldMkLst>
-          <pc:docMk/>
-          <pc:sldMk cId="1747856686" sldId="2370"/>
-        </pc:sldMkLst>
-        <pc:spChg chg="mod ord">
-          <ac:chgData name="Umair Hoodbhoy" userId="9134fddd-ebe0-41b2-9df4-5549cb596a18" providerId="ADAL" clId="{4748566E-7703-B448-B4C4-CCEEE3A860AE}" dt="2021-08-10T17:54:10.309" v="67" actId="20577"/>
-          <ac:spMkLst>
-            <pc:docMk/>
-            <pc:sldMk cId="1747856686" sldId="2370"/>
-            <ac:spMk id="2" creationId="{00000000-0000-0000-0000-000000000000}"/>
-          </ac:spMkLst>
-        </pc:spChg>
-        <pc:spChg chg="mod">
-          <ac:chgData name="Umair Hoodbhoy" userId="9134fddd-ebe0-41b2-9df4-5549cb596a18" providerId="ADAL" clId="{4748566E-7703-B448-B4C4-CCEEE3A860AE}" dt="2021-08-10T17:54:03.307" v="61" actId="207"/>
-          <ac:spMkLst>
-            <pc:docMk/>
-            <pc:sldMk cId="1747856686" sldId="2370"/>
-            <ac:spMk id="4" creationId="{32B4D05F-516D-A147-AC64-2D1062BA0EFF}"/>
-          </ac:spMkLst>
-        </pc:spChg>
-        <pc:spChg chg="del">
-          <ac:chgData name="Umair Hoodbhoy" userId="9134fddd-ebe0-41b2-9df4-5549cb596a18" providerId="ADAL" clId="{4748566E-7703-B448-B4C4-CCEEE3A860AE}" dt="2021-08-10T17:53:51.765" v="60" actId="478"/>
-          <ac:spMkLst>
-            <pc:docMk/>
-            <pc:sldMk cId="1747856686" sldId="2370"/>
-            <ac:spMk id="72" creationId="{74449390-30CE-8747-8CE9-EB1A0A1EE862}"/>
-          </ac:spMkLst>
-        </pc:spChg>
-      </pc:sldChg>
-      <pc:sldChg chg="delSp modSp mod modClrScheme chgLayout">
-        <pc:chgData name="Umair Hoodbhoy" userId="9134fddd-ebe0-41b2-9df4-5549cb596a18" providerId="ADAL" clId="{4748566E-7703-B448-B4C4-CCEEE3A860AE}" dt="2021-08-10T17:56:31.361" v="168" actId="478"/>
-        <pc:sldMkLst>
-          <pc:docMk/>
-          <pc:sldMk cId="3912369289" sldId="2373"/>
-        </pc:sldMkLst>
-        <pc:spChg chg="mod ord">
-          <ac:chgData name="Umair Hoodbhoy" userId="9134fddd-ebe0-41b2-9df4-5549cb596a18" providerId="ADAL" clId="{4748566E-7703-B448-B4C4-CCEEE3A860AE}" dt="2021-08-10T17:56:27.676" v="167" actId="6549"/>
-          <ac:spMkLst>
-            <pc:docMk/>
-            <pc:sldMk cId="3912369289" sldId="2373"/>
-            <ac:spMk id="2" creationId="{00000000-0000-0000-0000-000000000000}"/>
-          </ac:spMkLst>
-        </pc:spChg>
-        <pc:spChg chg="del">
-          <ac:chgData name="Umair Hoodbhoy" userId="9134fddd-ebe0-41b2-9df4-5549cb596a18" providerId="ADAL" clId="{4748566E-7703-B448-B4C4-CCEEE3A860AE}" dt="2021-08-10T17:56:31.361" v="168" actId="478"/>
-          <ac:spMkLst>
-            <pc:docMk/>
-            <pc:sldMk cId="3912369289" sldId="2373"/>
-            <ac:spMk id="5" creationId="{AD8E64C9-A686-8747-B08E-76ED41D30F48}"/>
-          </ac:spMkLst>
-        </pc:spChg>
-      </pc:sldChg>
-      <pc:sldChg chg="addSp delSp modSp mod modClrScheme chgLayout">
-        <pc:chgData name="Umair Hoodbhoy" userId="9134fddd-ebe0-41b2-9df4-5549cb596a18" providerId="ADAL" clId="{4748566E-7703-B448-B4C4-CCEEE3A860AE}" dt="2021-08-10T17:55:44.150" v="138" actId="403"/>
-        <pc:sldMkLst>
-          <pc:docMk/>
-          <pc:sldMk cId="2244422166" sldId="2382"/>
-        </pc:sldMkLst>
-        <pc:spChg chg="mod ord">
-          <ac:chgData name="Umair Hoodbhoy" userId="9134fddd-ebe0-41b2-9df4-5549cb596a18" providerId="ADAL" clId="{4748566E-7703-B448-B4C4-CCEEE3A860AE}" dt="2021-08-10T17:54:25.989" v="83" actId="20577"/>
-          <ac:spMkLst>
-            <pc:docMk/>
-            <pc:sldMk cId="2244422166" sldId="2382"/>
-            <ac:spMk id="2" creationId="{00000000-0000-0000-0000-000000000000}"/>
-          </ac:spMkLst>
-        </pc:spChg>
-        <pc:spChg chg="del">
-          <ac:chgData name="Umair Hoodbhoy" userId="9134fddd-ebe0-41b2-9df4-5549cb596a18" providerId="ADAL" clId="{4748566E-7703-B448-B4C4-CCEEE3A860AE}" dt="2021-08-10T17:54:39.319" v="85" actId="478"/>
-          <ac:spMkLst>
-            <pc:docMk/>
-            <pc:sldMk cId="2244422166" sldId="2382"/>
-            <ac:spMk id="3" creationId="{C66BA44C-6125-EF4F-BF54-4E066BC4F671}"/>
-          </ac:spMkLst>
-        </pc:spChg>
-        <pc:spChg chg="add mod ord">
-          <ac:chgData name="Umair Hoodbhoy" userId="9134fddd-ebe0-41b2-9df4-5549cb596a18" providerId="ADAL" clId="{4748566E-7703-B448-B4C4-CCEEE3A860AE}" dt="2021-08-10T17:55:44.150" v="138" actId="403"/>
-          <ac:spMkLst>
-            <pc:docMk/>
-            <pc:sldMk cId="2244422166" sldId="2382"/>
-            <ac:spMk id="4" creationId="{CD435090-19F6-5246-AA7B-E30444111FB4}"/>
-          </ac:spMkLst>
-        </pc:spChg>
-        <pc:spChg chg="del">
-          <ac:chgData name="Umair Hoodbhoy" userId="9134fddd-ebe0-41b2-9df4-5549cb596a18" providerId="ADAL" clId="{4748566E-7703-B448-B4C4-CCEEE3A860AE}" dt="2021-08-10T17:54:29.566" v="84" actId="478"/>
-          <ac:spMkLst>
-            <pc:docMk/>
-            <pc:sldMk cId="2244422166" sldId="2382"/>
-            <ac:spMk id="72" creationId="{74449390-30CE-8747-8CE9-EB1A0A1EE862}"/>
-          </ac:spMkLst>
-        </pc:spChg>
-      </pc:sldChg>
-      <pc:sldChg chg="delSp modSp mod modClrScheme chgLayout">
-        <pc:chgData name="Umair Hoodbhoy" userId="9134fddd-ebe0-41b2-9df4-5549cb596a18" providerId="ADAL" clId="{4748566E-7703-B448-B4C4-CCEEE3A860AE}" dt="2021-08-10T17:56:49.825" v="174"/>
-        <pc:sldMkLst>
-          <pc:docMk/>
-          <pc:sldMk cId="1610562100" sldId="2383"/>
-        </pc:sldMkLst>
-        <pc:spChg chg="mod ord">
-          <ac:chgData name="Umair Hoodbhoy" userId="9134fddd-ebe0-41b2-9df4-5549cb596a18" providerId="ADAL" clId="{4748566E-7703-B448-B4C4-CCEEE3A860AE}" dt="2021-08-10T17:56:49.825" v="174"/>
-          <ac:spMkLst>
-            <pc:docMk/>
-            <pc:sldMk cId="1610562100" sldId="2383"/>
-            <ac:spMk id="2" creationId="{00000000-0000-0000-0000-000000000000}"/>
-          </ac:spMkLst>
-        </pc:spChg>
-        <pc:spChg chg="del mod">
-          <ac:chgData name="Umair Hoodbhoy" userId="9134fddd-ebe0-41b2-9df4-5549cb596a18" providerId="ADAL" clId="{4748566E-7703-B448-B4C4-CCEEE3A860AE}" dt="2021-08-10T17:56:45.273" v="172" actId="478"/>
-          <ac:spMkLst>
-            <pc:docMk/>
-            <pc:sldMk cId="1610562100" sldId="2383"/>
-            <ac:spMk id="72" creationId="{74449390-30CE-8747-8CE9-EB1A0A1EE862}"/>
-          </ac:spMkLst>
-        </pc:spChg>
-      </pc:sldChg>
-      <pc:sldChg chg="modSp add del mod">
-        <pc:chgData name="Umair Hoodbhoy" userId="9134fddd-ebe0-41b2-9df4-5549cb596a18" providerId="ADAL" clId="{4748566E-7703-B448-B4C4-CCEEE3A860AE}" dt="2021-08-10T17:57:43.549" v="198" actId="2696"/>
-        <pc:sldMkLst>
-          <pc:docMk/>
-          <pc:sldMk cId="2201147969" sldId="2384"/>
-        </pc:sldMkLst>
-        <pc:spChg chg="mod">
-          <ac:chgData name="Umair Hoodbhoy" userId="9134fddd-ebe0-41b2-9df4-5549cb596a18" providerId="ADAL" clId="{4748566E-7703-B448-B4C4-CCEEE3A860AE}" dt="2021-08-10T17:52:19.197" v="35" actId="20577"/>
-          <ac:spMkLst>
-            <pc:docMk/>
-            <pc:sldMk cId="2201147969" sldId="2384"/>
-            <ac:spMk id="2" creationId="{9CA63561-8E66-894D-BA2E-15B2F7A193F5}"/>
-          </ac:spMkLst>
-        </pc:spChg>
-        <pc:spChg chg="mod">
-          <ac:chgData name="Umair Hoodbhoy" userId="9134fddd-ebe0-41b2-9df4-5549cb596a18" providerId="ADAL" clId="{4748566E-7703-B448-B4C4-CCEEE3A860AE}" dt="2021-08-10T17:52:09.229" v="28" actId="20577"/>
-          <ac:spMkLst>
-            <pc:docMk/>
-            <pc:sldMk cId="2201147969" sldId="2384"/>
-            <ac:spMk id="3" creationId="{AD53AA04-A301-D44D-8BCD-28A9784BA34E}"/>
-          </ac:spMkLst>
-        </pc:spChg>
-      </pc:sldChg>
-      <pc:sldChg chg="add del">
-        <pc:chgData name="Umair Hoodbhoy" userId="9134fddd-ebe0-41b2-9df4-5549cb596a18" providerId="ADAL" clId="{4748566E-7703-B448-B4C4-CCEEE3A860AE}" dt="2021-08-10T17:51:40.692" v="1"/>
-        <pc:sldMkLst>
-          <pc:docMk/>
-          <pc:sldMk cId="4266748344" sldId="2384"/>
-        </pc:sldMkLst>
-      </pc:sldChg>
-      <pc:sldMasterChg chg="del delSldLayout">
-        <pc:chgData name="Umair Hoodbhoy" userId="9134fddd-ebe0-41b2-9df4-5549cb596a18" providerId="ADAL" clId="{4748566E-7703-B448-B4C4-CCEEE3A860AE}" dt="2021-08-10T17:57:56.365" v="204" actId="2696"/>
-        <pc:sldMasterMkLst>
-          <pc:docMk/>
-          <pc:sldMasterMk cId="3787048019" sldId="2147483691"/>
-        </pc:sldMasterMkLst>
-        <pc:sldLayoutChg chg="del">
-          <pc:chgData name="Umair Hoodbhoy" userId="9134fddd-ebe0-41b2-9df4-5549cb596a18" providerId="ADAL" clId="{4748566E-7703-B448-B4C4-CCEEE3A860AE}" dt="2021-08-10T17:57:56.357" v="200" actId="2696"/>
-          <pc:sldLayoutMkLst>
-            <pc:docMk/>
-            <pc:sldMasterMk cId="3787048019" sldId="2147483691"/>
-            <pc:sldLayoutMk cId="3647867876" sldId="2147483692"/>
-          </pc:sldLayoutMkLst>
-        </pc:sldLayoutChg>
-        <pc:sldLayoutChg chg="del">
-          <pc:chgData name="Umair Hoodbhoy" userId="9134fddd-ebe0-41b2-9df4-5549cb596a18" providerId="ADAL" clId="{4748566E-7703-B448-B4C4-CCEEE3A860AE}" dt="2021-08-10T17:57:56.359" v="201" actId="2696"/>
-          <pc:sldLayoutMkLst>
-            <pc:docMk/>
-            <pc:sldMasterMk cId="3787048019" sldId="2147483691"/>
-            <pc:sldLayoutMk cId="191519106" sldId="2147483693"/>
-          </pc:sldLayoutMkLst>
-        </pc:sldLayoutChg>
-        <pc:sldLayoutChg chg="del">
-          <pc:chgData name="Umair Hoodbhoy" userId="9134fddd-ebe0-41b2-9df4-5549cb596a18" providerId="ADAL" clId="{4748566E-7703-B448-B4C4-CCEEE3A860AE}" dt="2021-08-10T17:57:56.361" v="202" actId="2696"/>
-          <pc:sldLayoutMkLst>
-            <pc:docMk/>
-            <pc:sldMasterMk cId="3787048019" sldId="2147483691"/>
-            <pc:sldLayoutMk cId="1899099703" sldId="2147483711"/>
-          </pc:sldLayoutMkLst>
-        </pc:sldLayoutChg>
-        <pc:sldLayoutChg chg="del">
-          <pc:chgData name="Umair Hoodbhoy" userId="9134fddd-ebe0-41b2-9df4-5549cb596a18" providerId="ADAL" clId="{4748566E-7703-B448-B4C4-CCEEE3A860AE}" dt="2021-08-10T17:57:56.363" v="203" actId="2696"/>
-          <pc:sldLayoutMkLst>
-            <pc:docMk/>
-            <pc:sldMasterMk cId="3787048019" sldId="2147483691"/>
-            <pc:sldLayoutMk cId="2952993144" sldId="2147483717"/>
-          </pc:sldLayoutMkLst>
-        </pc:sldLayoutChg>
-      </pc:sldMasterChg>
-      <pc:sldMasterChg chg="del delSldLayout">
-        <pc:chgData name="Umair Hoodbhoy" userId="9134fddd-ebe0-41b2-9df4-5549cb596a18" providerId="ADAL" clId="{4748566E-7703-B448-B4C4-CCEEE3A860AE}" dt="2021-08-10T17:57:26.105" v="196" actId="2696"/>
-        <pc:sldMasterMkLst>
-          <pc:docMk/>
-          <pc:sldMasterMk cId="1271404269" sldId="2147483694"/>
-        </pc:sldMasterMkLst>
-        <pc:sldLayoutChg chg="del">
-          <pc:chgData name="Umair Hoodbhoy" userId="9134fddd-ebe0-41b2-9df4-5549cb596a18" providerId="ADAL" clId="{4748566E-7703-B448-B4C4-CCEEE3A860AE}" dt="2021-08-10T17:57:26.084" v="185" actId="2696"/>
-          <pc:sldLayoutMkLst>
-            <pc:docMk/>
-            <pc:sldMasterMk cId="1271404269" sldId="2147483694"/>
-            <pc:sldLayoutMk cId="2566878239" sldId="2147483695"/>
-          </pc:sldLayoutMkLst>
-        </pc:sldLayoutChg>
-        <pc:sldLayoutChg chg="del">
-          <pc:chgData name="Umair Hoodbhoy" userId="9134fddd-ebe0-41b2-9df4-5549cb596a18" providerId="ADAL" clId="{4748566E-7703-B448-B4C4-CCEEE3A860AE}" dt="2021-08-10T17:57:26.087" v="186" actId="2696"/>
-          <pc:sldLayoutMkLst>
-            <pc:docMk/>
-            <pc:sldMasterMk cId="1271404269" sldId="2147483694"/>
-            <pc:sldLayoutMk cId="2098115044" sldId="2147483696"/>
-          </pc:sldLayoutMkLst>
-        </pc:sldLayoutChg>
-        <pc:sldLayoutChg chg="del">
-          <pc:chgData name="Umair Hoodbhoy" userId="9134fddd-ebe0-41b2-9df4-5549cb596a18" providerId="ADAL" clId="{4748566E-7703-B448-B4C4-CCEEE3A860AE}" dt="2021-08-10T17:57:26.089" v="187" actId="2696"/>
-          <pc:sldLayoutMkLst>
-            <pc:docMk/>
-            <pc:sldMasterMk cId="1271404269" sldId="2147483694"/>
-            <pc:sldLayoutMk cId="422562148" sldId="2147483697"/>
-          </pc:sldLayoutMkLst>
-        </pc:sldLayoutChg>
-        <pc:sldLayoutChg chg="del">
-          <pc:chgData name="Umair Hoodbhoy" userId="9134fddd-ebe0-41b2-9df4-5549cb596a18" providerId="ADAL" clId="{4748566E-7703-B448-B4C4-CCEEE3A860AE}" dt="2021-08-10T17:57:26.091" v="188" actId="2696"/>
-          <pc:sldLayoutMkLst>
-            <pc:docMk/>
-            <pc:sldMasterMk cId="1271404269" sldId="2147483694"/>
-            <pc:sldLayoutMk cId="3009420838" sldId="2147483698"/>
-          </pc:sldLayoutMkLst>
-        </pc:sldLayoutChg>
-        <pc:sldLayoutChg chg="del">
-          <pc:chgData name="Umair Hoodbhoy" userId="9134fddd-ebe0-41b2-9df4-5549cb596a18" providerId="ADAL" clId="{4748566E-7703-B448-B4C4-CCEEE3A860AE}" dt="2021-08-10T17:57:26.093" v="189" actId="2696"/>
-          <pc:sldLayoutMkLst>
-            <pc:docMk/>
-            <pc:sldMasterMk cId="1271404269" sldId="2147483694"/>
-            <pc:sldLayoutMk cId="908739393" sldId="2147483699"/>
-          </pc:sldLayoutMkLst>
-        </pc:sldLayoutChg>
-        <pc:sldLayoutChg chg="del">
-          <pc:chgData name="Umair Hoodbhoy" userId="9134fddd-ebe0-41b2-9df4-5549cb596a18" providerId="ADAL" clId="{4748566E-7703-B448-B4C4-CCEEE3A860AE}" dt="2021-08-10T17:57:26.095" v="190" actId="2696"/>
-          <pc:sldLayoutMkLst>
-            <pc:docMk/>
-            <pc:sldMasterMk cId="1271404269" sldId="2147483694"/>
-            <pc:sldLayoutMk cId="2682764831" sldId="2147483700"/>
-          </pc:sldLayoutMkLst>
-        </pc:sldLayoutChg>
-        <pc:sldLayoutChg chg="del">
-          <pc:chgData name="Umair Hoodbhoy" userId="9134fddd-ebe0-41b2-9df4-5549cb596a18" providerId="ADAL" clId="{4748566E-7703-B448-B4C4-CCEEE3A860AE}" dt="2021-08-10T17:57:26.096" v="191" actId="2696"/>
-          <pc:sldLayoutMkLst>
-            <pc:docMk/>
-            <pc:sldMasterMk cId="1271404269" sldId="2147483694"/>
-            <pc:sldLayoutMk cId="3100913433" sldId="2147483701"/>
-          </pc:sldLayoutMkLst>
-        </pc:sldLayoutChg>
-        <pc:sldLayoutChg chg="del">
-          <pc:chgData name="Umair Hoodbhoy" userId="9134fddd-ebe0-41b2-9df4-5549cb596a18" providerId="ADAL" clId="{4748566E-7703-B448-B4C4-CCEEE3A860AE}" dt="2021-08-10T17:57:26.098" v="192" actId="2696"/>
-          <pc:sldLayoutMkLst>
-            <pc:docMk/>
-            <pc:sldMasterMk cId="1271404269" sldId="2147483694"/>
-            <pc:sldLayoutMk cId="3445979246" sldId="2147483702"/>
-          </pc:sldLayoutMkLst>
-        </pc:sldLayoutChg>
-        <pc:sldLayoutChg chg="del">
-          <pc:chgData name="Umair Hoodbhoy" userId="9134fddd-ebe0-41b2-9df4-5549cb596a18" providerId="ADAL" clId="{4748566E-7703-B448-B4C4-CCEEE3A860AE}" dt="2021-08-10T17:57:26.099" v="193" actId="2696"/>
-          <pc:sldLayoutMkLst>
-            <pc:docMk/>
-            <pc:sldMasterMk cId="1271404269" sldId="2147483694"/>
-            <pc:sldLayoutMk cId="385845009" sldId="2147483703"/>
-          </pc:sldLayoutMkLst>
-        </pc:sldLayoutChg>
-        <pc:sldLayoutChg chg="del">
-          <pc:chgData name="Umair Hoodbhoy" userId="9134fddd-ebe0-41b2-9df4-5549cb596a18" providerId="ADAL" clId="{4748566E-7703-B448-B4C4-CCEEE3A860AE}" dt="2021-08-10T17:57:26.100" v="194" actId="2696"/>
-          <pc:sldLayoutMkLst>
-            <pc:docMk/>
-            <pc:sldMasterMk cId="1271404269" sldId="2147483694"/>
-            <pc:sldLayoutMk cId="2028473393" sldId="2147483704"/>
-          </pc:sldLayoutMkLst>
-        </pc:sldLayoutChg>
-        <pc:sldLayoutChg chg="del">
-          <pc:chgData name="Umair Hoodbhoy" userId="9134fddd-ebe0-41b2-9df4-5549cb596a18" providerId="ADAL" clId="{4748566E-7703-B448-B4C4-CCEEE3A860AE}" dt="2021-08-10T17:57:26.102" v="195" actId="2696"/>
-          <pc:sldLayoutMkLst>
-            <pc:docMk/>
-            <pc:sldMasterMk cId="1271404269" sldId="2147483694"/>
-            <pc:sldLayoutMk cId="4134816642" sldId="2147483705"/>
-          </pc:sldLayoutMkLst>
-        </pc:sldLayoutChg>
-      </pc:sldMasterChg>
-    </pc:docChg>
-  </pc:docChgLst>
-  <pc:docChgLst>
-    <pc:chgData name="Frankie Stroud" userId="c72d88b8-2dd4-4ee5-af3e-1cfd11426328" providerId="ADAL" clId="{41366C87-626C-3A49-96F3-24778FBED23E}"/>
-    <pc:docChg chg="addSld delSld">
-      <pc:chgData name="Frankie Stroud" userId="c72d88b8-2dd4-4ee5-af3e-1cfd11426328" providerId="ADAL" clId="{41366C87-626C-3A49-96F3-24778FBED23E}" dt="2022-02-09T00:26:23.795" v="1" actId="2696"/>
-      <pc:docMkLst>
-        <pc:docMk/>
-      </pc:docMkLst>
-      <pc:sldChg chg="new del">
-        <pc:chgData name="Frankie Stroud" userId="c72d88b8-2dd4-4ee5-af3e-1cfd11426328" providerId="ADAL" clId="{41366C87-626C-3A49-96F3-24778FBED23E}" dt="2022-02-09T00:26:23.795" v="1" actId="2696"/>
-        <pc:sldMkLst>
-          <pc:docMk/>
-          <pc:sldMk cId="203692221" sldId="2385"/>
-        </pc:sldMkLst>
-      </pc:sldChg>
-    </pc:docChg>
-  </pc:docChgLst>
-  <pc:docChgLst>
-    <pc:chgData name="Aashish Jolly" userId="e557bdd7-a250-4d09-a910-fd68fcaaf6da" providerId="ADAL" clId="{DA6443C0-4E01-B247-A597-AB3909B5E0E3}"/>
+    <pc:chgData name="Tomasz Klimczyk" userId="8fae020c-eb24-498a-bfc2-b441c4d5aed8" providerId="ADAL" clId="{9A33C1D5-C28E-7A4E-BB8E-15A549B9C219}"/>
     <pc:docChg chg="modShowInfo">
-      <pc:chgData name="Aashish Jolly" userId="e557bdd7-a250-4d09-a910-fd68fcaaf6da" providerId="ADAL" clId="{DA6443C0-4E01-B247-A597-AB3909B5E0E3}" dt="2022-05-30T11:27:33.187" v="0" actId="2744"/>
+      <pc:chgData name="Tomasz Klimczyk" userId="8fae020c-eb24-498a-bfc2-b441c4d5aed8" providerId="ADAL" clId="{9A33C1D5-C28E-7A4E-BB8E-15A549B9C219}" dt="2020-12-02T17:16:22.668" v="0" actId="2744"/>
       <pc:docMkLst>
         <pc:docMk/>
       </pc:docMkLst>
@@ -3162,6 +2500,668 @@
           </ac:graphicFrameMkLst>
         </pc:graphicFrameChg>
       </pc:sldChg>
+    </pc:docChg>
+  </pc:docChgLst>
+  <pc:docChgLst>
+    <pc:chgData name="Umair Hoodbhoy" userId="9134fddd-ebe0-41b2-9df4-5549cb596a18" providerId="ADAL" clId="{04D12CB0-48B6-184C-9699-BB15AD0F29F9}"/>
+    <pc:docChg chg="delSld">
+      <pc:chgData name="Umair Hoodbhoy" userId="9134fddd-ebe0-41b2-9df4-5549cb596a18" providerId="ADAL" clId="{04D12CB0-48B6-184C-9699-BB15AD0F29F9}" dt="2021-05-18T21:18:28.453" v="0" actId="2696"/>
+      <pc:docMkLst>
+        <pc:docMk/>
+      </pc:docMkLst>
+      <pc:sldChg chg="del">
+        <pc:chgData name="Umair Hoodbhoy" userId="9134fddd-ebe0-41b2-9df4-5549cb596a18" providerId="ADAL" clId="{04D12CB0-48B6-184C-9699-BB15AD0F29F9}" dt="2021-05-18T21:18:28.453" v="0" actId="2696"/>
+        <pc:sldMkLst>
+          <pc:docMk/>
+          <pc:sldMk cId="1253366361" sldId="2171"/>
+        </pc:sldMkLst>
+      </pc:sldChg>
+    </pc:docChg>
+  </pc:docChgLst>
+  <pc:docChgLst>
+    <pc:chgData name="Nicolas Delecroix" userId="9aea8ee3-214f-409e-bcc8-e981c3ad58f1" providerId="ADAL" clId="{AA833F7C-A8CB-B84C-99BE-3BE235C17BFC}"/>
+    <pc:docChg chg="custSel modSld">
+      <pc:chgData name="Nicolas Delecroix" userId="9aea8ee3-214f-409e-bcc8-e981c3ad58f1" providerId="ADAL" clId="{AA833F7C-A8CB-B84C-99BE-3BE235C17BFC}" dt="2020-06-24T22:11:44.257" v="0" actId="478"/>
+      <pc:docMkLst>
+        <pc:docMk/>
+      </pc:docMkLst>
+      <pc:sldChg chg="delSp">
+        <pc:chgData name="Nicolas Delecroix" userId="9aea8ee3-214f-409e-bcc8-e981c3ad58f1" providerId="ADAL" clId="{AA833F7C-A8CB-B84C-99BE-3BE235C17BFC}" dt="2020-06-24T22:11:44.257" v="0" actId="478"/>
+        <pc:sldMkLst>
+          <pc:docMk/>
+          <pc:sldMk cId="1323792454" sldId="2199"/>
+        </pc:sldMkLst>
+        <pc:spChg chg="del">
+          <ac:chgData name="Nicolas Delecroix" userId="9aea8ee3-214f-409e-bcc8-e981c3ad58f1" providerId="ADAL" clId="{AA833F7C-A8CB-B84C-99BE-3BE235C17BFC}" dt="2020-06-24T22:11:44.257" v="0" actId="478"/>
+          <ac:spMkLst>
+            <pc:docMk/>
+            <pc:sldMk cId="1323792454" sldId="2199"/>
+            <ac:spMk id="7" creationId="{DCA7D4D2-BF23-E74C-A8CD-D9A8FE709994}"/>
+          </ac:spMkLst>
+        </pc:spChg>
+      </pc:sldChg>
+    </pc:docChg>
+  </pc:docChgLst>
+  <pc:docChgLst>
+    <pc:chgData name="Umair Hoodbhoy" userId="9134fddd-ebe0-41b2-9df4-5549cb596a18" providerId="ADAL" clId="{4748566E-7703-B448-B4C4-CCEEE3A860AE}"/>
+    <pc:docChg chg="undo custSel addSld delSld modSld delMainMaster">
+      <pc:chgData name="Umair Hoodbhoy" userId="9134fddd-ebe0-41b2-9df4-5549cb596a18" providerId="ADAL" clId="{4748566E-7703-B448-B4C4-CCEEE3A860AE}" dt="2021-08-10T17:57:56.365" v="204" actId="2696"/>
+      <pc:docMkLst>
+        <pc:docMk/>
+      </pc:docMkLst>
+      <pc:sldChg chg="addSp modSp mod modClrScheme chgLayout">
+        <pc:chgData name="Umair Hoodbhoy" userId="9134fddd-ebe0-41b2-9df4-5549cb596a18" providerId="ADAL" clId="{4748566E-7703-B448-B4C4-CCEEE3A860AE}" dt="2021-08-10T17:57:10.836" v="184" actId="20577"/>
+        <pc:sldMkLst>
+          <pc:docMk/>
+          <pc:sldMk cId="2628666855" sldId="2035"/>
+        </pc:sldMkLst>
+        <pc:spChg chg="add mod ord">
+          <ac:chgData name="Umair Hoodbhoy" userId="9134fddd-ebe0-41b2-9df4-5549cb596a18" providerId="ADAL" clId="{4748566E-7703-B448-B4C4-CCEEE3A860AE}" dt="2021-08-10T17:57:00.360" v="175" actId="700"/>
+          <ac:spMkLst>
+            <pc:docMk/>
+            <pc:sldMk cId="2628666855" sldId="2035"/>
+            <ac:spMk id="2" creationId="{496F1C75-340C-CD4E-9D44-90E650783231}"/>
+          </ac:spMkLst>
+        </pc:spChg>
+        <pc:spChg chg="add mod ord">
+          <ac:chgData name="Umair Hoodbhoy" userId="9134fddd-ebe0-41b2-9df4-5549cb596a18" providerId="ADAL" clId="{4748566E-7703-B448-B4C4-CCEEE3A860AE}" dt="2021-08-10T17:57:00.360" v="175" actId="700"/>
+          <ac:spMkLst>
+            <pc:docMk/>
+            <pc:sldMk cId="2628666855" sldId="2035"/>
+            <ac:spMk id="3" creationId="{E5BACD7D-FD55-EA45-9031-67F36E87E081}"/>
+          </ac:spMkLst>
+        </pc:spChg>
+        <pc:spChg chg="mod ord">
+          <ac:chgData name="Umair Hoodbhoy" userId="9134fddd-ebe0-41b2-9df4-5549cb596a18" providerId="ADAL" clId="{4748566E-7703-B448-B4C4-CCEEE3A860AE}" dt="2021-08-10T17:57:10.836" v="184" actId="20577"/>
+          <ac:spMkLst>
+            <pc:docMk/>
+            <pc:sldMk cId="2628666855" sldId="2035"/>
+            <ac:spMk id="4" creationId="{E87735F1-603B-3041-BABB-205BB8D0A30E}"/>
+          </ac:spMkLst>
+        </pc:spChg>
+        <pc:spChg chg="add mod ord">
+          <ac:chgData name="Umair Hoodbhoy" userId="9134fddd-ebe0-41b2-9df4-5549cb596a18" providerId="ADAL" clId="{4748566E-7703-B448-B4C4-CCEEE3A860AE}" dt="2021-08-10T17:57:00.360" v="175" actId="700"/>
+          <ac:spMkLst>
+            <pc:docMk/>
+            <pc:sldMk cId="2628666855" sldId="2035"/>
+            <ac:spMk id="5" creationId="{86262720-CE1C-6146-A606-2368BB71E25C}"/>
+          </ac:spMkLst>
+        </pc:spChg>
+        <pc:spChg chg="add mod ord">
+          <ac:chgData name="Umair Hoodbhoy" userId="9134fddd-ebe0-41b2-9df4-5549cb596a18" providerId="ADAL" clId="{4748566E-7703-B448-B4C4-CCEEE3A860AE}" dt="2021-08-10T17:57:00.360" v="175" actId="700"/>
+          <ac:spMkLst>
+            <pc:docMk/>
+            <pc:sldMk cId="2628666855" sldId="2035"/>
+            <ac:spMk id="6" creationId="{61CA4AF6-B2A5-054F-BEDD-5BE771BC700C}"/>
+          </ac:spMkLst>
+        </pc:spChg>
+      </pc:sldChg>
+      <pc:sldChg chg="del">
+        <pc:chgData name="Umair Hoodbhoy" userId="9134fddd-ebe0-41b2-9df4-5549cb596a18" providerId="ADAL" clId="{4748566E-7703-B448-B4C4-CCEEE3A860AE}" dt="2021-08-10T17:57:45.131" v="199" actId="2696"/>
+        <pc:sldMkLst>
+          <pc:docMk/>
+          <pc:sldMk cId="1323792454" sldId="2199"/>
+        </pc:sldMkLst>
+      </pc:sldChg>
+      <pc:sldChg chg="modSp mod modClrScheme chgLayout">
+        <pc:chgData name="Umair Hoodbhoy" userId="9134fddd-ebe0-41b2-9df4-5549cb596a18" providerId="ADAL" clId="{4748566E-7703-B448-B4C4-CCEEE3A860AE}" dt="2021-08-10T17:53:21.286" v="46" actId="1076"/>
+        <pc:sldMkLst>
+          <pc:docMk/>
+          <pc:sldMk cId="2103512187" sldId="2225"/>
+        </pc:sldMkLst>
+        <pc:spChg chg="mod ord">
+          <ac:chgData name="Umair Hoodbhoy" userId="9134fddd-ebe0-41b2-9df4-5549cb596a18" providerId="ADAL" clId="{4748566E-7703-B448-B4C4-CCEEE3A860AE}" dt="2021-08-10T17:52:32.459" v="37" actId="27636"/>
+          <ac:spMkLst>
+            <pc:docMk/>
+            <pc:sldMk cId="2103512187" sldId="2225"/>
+            <ac:spMk id="2" creationId="{00000000-0000-0000-0000-000000000000}"/>
+          </ac:spMkLst>
+        </pc:spChg>
+        <pc:spChg chg="mod">
+          <ac:chgData name="Umair Hoodbhoy" userId="9134fddd-ebe0-41b2-9df4-5549cb596a18" providerId="ADAL" clId="{4748566E-7703-B448-B4C4-CCEEE3A860AE}" dt="2021-08-10T17:52:40.174" v="38" actId="1076"/>
+          <ac:spMkLst>
+            <pc:docMk/>
+            <pc:sldMk cId="2103512187" sldId="2225"/>
+            <ac:spMk id="3" creationId="{03FAE4DA-8F0C-454A-AEDB-BDBEB38A1909}"/>
+          </ac:spMkLst>
+        </pc:spChg>
+        <pc:spChg chg="mod">
+          <ac:chgData name="Umair Hoodbhoy" userId="9134fddd-ebe0-41b2-9df4-5549cb596a18" providerId="ADAL" clId="{4748566E-7703-B448-B4C4-CCEEE3A860AE}" dt="2021-08-10T17:53:21.286" v="46" actId="1076"/>
+          <ac:spMkLst>
+            <pc:docMk/>
+            <pc:sldMk cId="2103512187" sldId="2225"/>
+            <ac:spMk id="4" creationId="{1F6A7559-F12D-2247-9846-17AAB21467A1}"/>
+          </ac:spMkLst>
+        </pc:spChg>
+        <pc:spChg chg="mod">
+          <ac:chgData name="Umair Hoodbhoy" userId="9134fddd-ebe0-41b2-9df4-5549cb596a18" providerId="ADAL" clId="{4748566E-7703-B448-B4C4-CCEEE3A860AE}" dt="2021-08-10T17:53:10.470" v="44" actId="1076"/>
+          <ac:spMkLst>
+            <pc:docMk/>
+            <pc:sldMk cId="2103512187" sldId="2225"/>
+            <ac:spMk id="90" creationId="{76B8B6F4-E593-4E4A-A308-94373D8EDB31}"/>
+          </ac:spMkLst>
+        </pc:spChg>
+        <pc:spChg chg="mod">
+          <ac:chgData name="Umair Hoodbhoy" userId="9134fddd-ebe0-41b2-9df4-5549cb596a18" providerId="ADAL" clId="{4748566E-7703-B448-B4C4-CCEEE3A860AE}" dt="2021-08-10T17:53:10.470" v="44" actId="1076"/>
+          <ac:spMkLst>
+            <pc:docMk/>
+            <pc:sldMk cId="2103512187" sldId="2225"/>
+            <ac:spMk id="91" creationId="{F128FAAD-BB95-5B40-8084-BDA3DC3275DD}"/>
+          </ac:spMkLst>
+        </pc:spChg>
+        <pc:spChg chg="mod">
+          <ac:chgData name="Umair Hoodbhoy" userId="9134fddd-ebe0-41b2-9df4-5549cb596a18" providerId="ADAL" clId="{4748566E-7703-B448-B4C4-CCEEE3A860AE}" dt="2021-08-10T17:53:10.470" v="44" actId="1076"/>
+          <ac:spMkLst>
+            <pc:docMk/>
+            <pc:sldMk cId="2103512187" sldId="2225"/>
+            <ac:spMk id="92" creationId="{8C85B914-B9D2-DE4C-9B3D-5D04B370B046}"/>
+          </ac:spMkLst>
+        </pc:spChg>
+        <pc:spChg chg="mod">
+          <ac:chgData name="Umair Hoodbhoy" userId="9134fddd-ebe0-41b2-9df4-5549cb596a18" providerId="ADAL" clId="{4748566E-7703-B448-B4C4-CCEEE3A860AE}" dt="2021-08-10T17:53:10.470" v="44" actId="1076"/>
+          <ac:spMkLst>
+            <pc:docMk/>
+            <pc:sldMk cId="2103512187" sldId="2225"/>
+            <ac:spMk id="94" creationId="{0A6F1F27-8CD1-E645-93CC-A929B156A531}"/>
+          </ac:spMkLst>
+        </pc:spChg>
+        <pc:spChg chg="mod">
+          <ac:chgData name="Umair Hoodbhoy" userId="9134fddd-ebe0-41b2-9df4-5549cb596a18" providerId="ADAL" clId="{4748566E-7703-B448-B4C4-CCEEE3A860AE}" dt="2021-08-10T17:53:10.470" v="44" actId="1076"/>
+          <ac:spMkLst>
+            <pc:docMk/>
+            <pc:sldMk cId="2103512187" sldId="2225"/>
+            <ac:spMk id="96" creationId="{BB7BA867-946E-9B49-8D54-D4EEC1D68CD4}"/>
+          </ac:spMkLst>
+        </pc:spChg>
+        <pc:spChg chg="mod">
+          <ac:chgData name="Umair Hoodbhoy" userId="9134fddd-ebe0-41b2-9df4-5549cb596a18" providerId="ADAL" clId="{4748566E-7703-B448-B4C4-CCEEE3A860AE}" dt="2021-08-10T17:52:57.308" v="42" actId="1076"/>
+          <ac:spMkLst>
+            <pc:docMk/>
+            <pc:sldMk cId="2103512187" sldId="2225"/>
+            <ac:spMk id="100" creationId="{C99C00EB-C846-B143-B7E0-183B7B4CFF4C}"/>
+          </ac:spMkLst>
+        </pc:spChg>
+        <pc:spChg chg="mod">
+          <ac:chgData name="Umair Hoodbhoy" userId="9134fddd-ebe0-41b2-9df4-5549cb596a18" providerId="ADAL" clId="{4748566E-7703-B448-B4C4-CCEEE3A860AE}" dt="2021-08-10T17:52:48.067" v="40" actId="14100"/>
+          <ac:spMkLst>
+            <pc:docMk/>
+            <pc:sldMk cId="2103512187" sldId="2225"/>
+            <ac:spMk id="105" creationId="{483A1C07-5F29-DC4C-889A-C93106362F92}"/>
+          </ac:spMkLst>
+        </pc:spChg>
+        <pc:spChg chg="mod">
+          <ac:chgData name="Umair Hoodbhoy" userId="9134fddd-ebe0-41b2-9df4-5549cb596a18" providerId="ADAL" clId="{4748566E-7703-B448-B4C4-CCEEE3A860AE}" dt="2021-08-10T17:53:10.470" v="44" actId="1076"/>
+          <ac:spMkLst>
+            <pc:docMk/>
+            <pc:sldMk cId="2103512187" sldId="2225"/>
+            <ac:spMk id="106" creationId="{26AADCF0-997A-5E47-9A49-4C90A0C184D3}"/>
+          </ac:spMkLst>
+        </pc:spChg>
+        <pc:spChg chg="mod">
+          <ac:chgData name="Umair Hoodbhoy" userId="9134fddd-ebe0-41b2-9df4-5549cb596a18" providerId="ADAL" clId="{4748566E-7703-B448-B4C4-CCEEE3A860AE}" dt="2021-08-10T17:53:10.470" v="44" actId="1076"/>
+          <ac:spMkLst>
+            <pc:docMk/>
+            <pc:sldMk cId="2103512187" sldId="2225"/>
+            <ac:spMk id="107" creationId="{9B8DB198-32F7-544B-BF32-414A02D43B93}"/>
+          </ac:spMkLst>
+        </pc:spChg>
+        <pc:spChg chg="mod">
+          <ac:chgData name="Umair Hoodbhoy" userId="9134fddd-ebe0-41b2-9df4-5549cb596a18" providerId="ADAL" clId="{4748566E-7703-B448-B4C4-CCEEE3A860AE}" dt="2021-08-10T17:53:10.470" v="44" actId="1076"/>
+          <ac:spMkLst>
+            <pc:docMk/>
+            <pc:sldMk cId="2103512187" sldId="2225"/>
+            <ac:spMk id="108" creationId="{BA7757C3-48A7-1C4C-8BDC-3E290DCFD8C7}"/>
+          </ac:spMkLst>
+        </pc:spChg>
+        <pc:spChg chg="mod">
+          <ac:chgData name="Umair Hoodbhoy" userId="9134fddd-ebe0-41b2-9df4-5549cb596a18" providerId="ADAL" clId="{4748566E-7703-B448-B4C4-CCEEE3A860AE}" dt="2021-08-10T17:53:10.470" v="44" actId="1076"/>
+          <ac:spMkLst>
+            <pc:docMk/>
+            <pc:sldMk cId="2103512187" sldId="2225"/>
+            <ac:spMk id="109" creationId="{AAE53226-1C00-EA43-B5A1-3D5796A3F06A}"/>
+          </ac:spMkLst>
+        </pc:spChg>
+        <pc:spChg chg="mod">
+          <ac:chgData name="Umair Hoodbhoy" userId="9134fddd-ebe0-41b2-9df4-5549cb596a18" providerId="ADAL" clId="{4748566E-7703-B448-B4C4-CCEEE3A860AE}" dt="2021-08-10T17:53:10.470" v="44" actId="1076"/>
+          <ac:spMkLst>
+            <pc:docMk/>
+            <pc:sldMk cId="2103512187" sldId="2225"/>
+            <ac:spMk id="110" creationId="{C5785B33-50C7-5D44-8FA9-5EB084335B71}"/>
+          </ac:spMkLst>
+        </pc:spChg>
+        <pc:spChg chg="mod">
+          <ac:chgData name="Umair Hoodbhoy" userId="9134fddd-ebe0-41b2-9df4-5549cb596a18" providerId="ADAL" clId="{4748566E-7703-B448-B4C4-CCEEE3A860AE}" dt="2021-08-10T17:53:10.470" v="44" actId="1076"/>
+          <ac:spMkLst>
+            <pc:docMk/>
+            <pc:sldMk cId="2103512187" sldId="2225"/>
+            <ac:spMk id="111" creationId="{654B31B9-FC86-444D-852B-3C2BCF179086}"/>
+          </ac:spMkLst>
+        </pc:spChg>
+        <pc:spChg chg="mod">
+          <ac:chgData name="Umair Hoodbhoy" userId="9134fddd-ebe0-41b2-9df4-5549cb596a18" providerId="ADAL" clId="{4748566E-7703-B448-B4C4-CCEEE3A860AE}" dt="2021-08-10T17:53:10.470" v="44" actId="1076"/>
+          <ac:spMkLst>
+            <pc:docMk/>
+            <pc:sldMk cId="2103512187" sldId="2225"/>
+            <ac:spMk id="112" creationId="{9CA40433-8D8A-9841-A471-F69205EEF198}"/>
+          </ac:spMkLst>
+        </pc:spChg>
+        <pc:spChg chg="mod">
+          <ac:chgData name="Umair Hoodbhoy" userId="9134fddd-ebe0-41b2-9df4-5549cb596a18" providerId="ADAL" clId="{4748566E-7703-B448-B4C4-CCEEE3A860AE}" dt="2021-08-10T17:53:10.470" v="44" actId="1076"/>
+          <ac:spMkLst>
+            <pc:docMk/>
+            <pc:sldMk cId="2103512187" sldId="2225"/>
+            <ac:spMk id="113" creationId="{DE07D109-6FC2-A541-8342-BBFAE1F6C5CC}"/>
+          </ac:spMkLst>
+        </pc:spChg>
+        <pc:spChg chg="mod">
+          <ac:chgData name="Umair Hoodbhoy" userId="9134fddd-ebe0-41b2-9df4-5549cb596a18" providerId="ADAL" clId="{4748566E-7703-B448-B4C4-CCEEE3A860AE}" dt="2021-08-10T17:53:10.470" v="44" actId="1076"/>
+          <ac:spMkLst>
+            <pc:docMk/>
+            <pc:sldMk cId="2103512187" sldId="2225"/>
+            <ac:spMk id="114" creationId="{85898ACB-E6B6-D742-90A8-8FF6AF967660}"/>
+          </ac:spMkLst>
+        </pc:spChg>
+        <pc:spChg chg="mod">
+          <ac:chgData name="Umair Hoodbhoy" userId="9134fddd-ebe0-41b2-9df4-5549cb596a18" providerId="ADAL" clId="{4748566E-7703-B448-B4C4-CCEEE3A860AE}" dt="2021-08-10T17:53:10.470" v="44" actId="1076"/>
+          <ac:spMkLst>
+            <pc:docMk/>
+            <pc:sldMk cId="2103512187" sldId="2225"/>
+            <ac:spMk id="115" creationId="{F61538D8-912C-5847-A893-E94A82D9A2B2}"/>
+          </ac:spMkLst>
+        </pc:spChg>
+        <pc:spChg chg="mod">
+          <ac:chgData name="Umair Hoodbhoy" userId="9134fddd-ebe0-41b2-9df4-5549cb596a18" providerId="ADAL" clId="{4748566E-7703-B448-B4C4-CCEEE3A860AE}" dt="2021-08-10T17:53:10.470" v="44" actId="1076"/>
+          <ac:spMkLst>
+            <pc:docMk/>
+            <pc:sldMk cId="2103512187" sldId="2225"/>
+            <ac:spMk id="116" creationId="{992E6830-C72D-8543-9B20-8E9CDD751F59}"/>
+          </ac:spMkLst>
+        </pc:spChg>
+        <pc:spChg chg="mod">
+          <ac:chgData name="Umair Hoodbhoy" userId="9134fddd-ebe0-41b2-9df4-5549cb596a18" providerId="ADAL" clId="{4748566E-7703-B448-B4C4-CCEEE3A860AE}" dt="2021-08-10T17:53:10.470" v="44" actId="1076"/>
+          <ac:spMkLst>
+            <pc:docMk/>
+            <pc:sldMk cId="2103512187" sldId="2225"/>
+            <ac:spMk id="117" creationId="{8205DA29-FB5C-E04B-87F0-D1247D7C47D7}"/>
+          </ac:spMkLst>
+        </pc:spChg>
+        <pc:spChg chg="mod">
+          <ac:chgData name="Umair Hoodbhoy" userId="9134fddd-ebe0-41b2-9df4-5549cb596a18" providerId="ADAL" clId="{4748566E-7703-B448-B4C4-CCEEE3A860AE}" dt="2021-08-10T17:53:10.470" v="44" actId="1076"/>
+          <ac:spMkLst>
+            <pc:docMk/>
+            <pc:sldMk cId="2103512187" sldId="2225"/>
+            <ac:spMk id="118" creationId="{176379BC-6157-7842-840C-932EA9FBD1F7}"/>
+          </ac:spMkLst>
+        </pc:spChg>
+        <pc:spChg chg="mod">
+          <ac:chgData name="Umair Hoodbhoy" userId="9134fddd-ebe0-41b2-9df4-5549cb596a18" providerId="ADAL" clId="{4748566E-7703-B448-B4C4-CCEEE3A860AE}" dt="2021-08-10T17:53:01.437" v="43" actId="14100"/>
+          <ac:spMkLst>
+            <pc:docMk/>
+            <pc:sldMk cId="2103512187" sldId="2225"/>
+            <ac:spMk id="127" creationId="{0E9D4DE5-8621-A445-BF6D-0111E488092A}"/>
+          </ac:spMkLst>
+        </pc:spChg>
+        <pc:cxnChg chg="mod">
+          <ac:chgData name="Umair Hoodbhoy" userId="9134fddd-ebe0-41b2-9df4-5549cb596a18" providerId="ADAL" clId="{4748566E-7703-B448-B4C4-CCEEE3A860AE}" dt="2021-08-10T17:53:10.470" v="44" actId="1076"/>
+          <ac:cxnSpMkLst>
+            <pc:docMk/>
+            <pc:sldMk cId="2103512187" sldId="2225"/>
+            <ac:cxnSpMk id="84" creationId="{84CCA56B-746F-264E-B03F-0F7DCA4C2D1E}"/>
+          </ac:cxnSpMkLst>
+        </pc:cxnChg>
+        <pc:cxnChg chg="mod">
+          <ac:chgData name="Umair Hoodbhoy" userId="9134fddd-ebe0-41b2-9df4-5549cb596a18" providerId="ADAL" clId="{4748566E-7703-B448-B4C4-CCEEE3A860AE}" dt="2021-08-10T17:53:10.470" v="44" actId="1076"/>
+          <ac:cxnSpMkLst>
+            <pc:docMk/>
+            <pc:sldMk cId="2103512187" sldId="2225"/>
+            <ac:cxnSpMk id="85" creationId="{961AC784-FFF7-1C4A-9A5A-C5B397B0DD66}"/>
+          </ac:cxnSpMkLst>
+        </pc:cxnChg>
+        <pc:cxnChg chg="mod">
+          <ac:chgData name="Umair Hoodbhoy" userId="9134fddd-ebe0-41b2-9df4-5549cb596a18" providerId="ADAL" clId="{4748566E-7703-B448-B4C4-CCEEE3A860AE}" dt="2021-08-10T17:53:10.470" v="44" actId="1076"/>
+          <ac:cxnSpMkLst>
+            <pc:docMk/>
+            <pc:sldMk cId="2103512187" sldId="2225"/>
+            <ac:cxnSpMk id="86" creationId="{158C606F-AFC0-8F4D-9599-A5AE24930BD2}"/>
+          </ac:cxnSpMkLst>
+        </pc:cxnChg>
+        <pc:cxnChg chg="mod">
+          <ac:chgData name="Umair Hoodbhoy" userId="9134fddd-ebe0-41b2-9df4-5549cb596a18" providerId="ADAL" clId="{4748566E-7703-B448-B4C4-CCEEE3A860AE}" dt="2021-08-10T17:53:10.470" v="44" actId="1076"/>
+          <ac:cxnSpMkLst>
+            <pc:docMk/>
+            <pc:sldMk cId="2103512187" sldId="2225"/>
+            <ac:cxnSpMk id="87" creationId="{9E58FBBA-FB66-1640-ABA0-2B2D04D93218}"/>
+          </ac:cxnSpMkLst>
+        </pc:cxnChg>
+        <pc:cxnChg chg="mod">
+          <ac:chgData name="Umair Hoodbhoy" userId="9134fddd-ebe0-41b2-9df4-5549cb596a18" providerId="ADAL" clId="{4748566E-7703-B448-B4C4-CCEEE3A860AE}" dt="2021-08-10T17:53:10.470" v="44" actId="1076"/>
+          <ac:cxnSpMkLst>
+            <pc:docMk/>
+            <pc:sldMk cId="2103512187" sldId="2225"/>
+            <ac:cxnSpMk id="88" creationId="{FF69ECFF-088B-7A40-A7DA-5F46CF15E6A3}"/>
+          </ac:cxnSpMkLst>
+        </pc:cxnChg>
+        <pc:cxnChg chg="mod">
+          <ac:chgData name="Umair Hoodbhoy" userId="9134fddd-ebe0-41b2-9df4-5549cb596a18" providerId="ADAL" clId="{4748566E-7703-B448-B4C4-CCEEE3A860AE}" dt="2021-08-10T17:53:10.470" v="44" actId="1076"/>
+          <ac:cxnSpMkLst>
+            <pc:docMk/>
+            <pc:sldMk cId="2103512187" sldId="2225"/>
+            <ac:cxnSpMk id="119" creationId="{CD0786B7-6AD0-2049-9214-EF24E444E541}"/>
+          </ac:cxnSpMkLst>
+        </pc:cxnChg>
+        <pc:cxnChg chg="mod">
+          <ac:chgData name="Umair Hoodbhoy" userId="9134fddd-ebe0-41b2-9df4-5549cb596a18" providerId="ADAL" clId="{4748566E-7703-B448-B4C4-CCEEE3A860AE}" dt="2021-08-10T17:53:10.470" v="44" actId="1076"/>
+          <ac:cxnSpMkLst>
+            <pc:docMk/>
+            <pc:sldMk cId="2103512187" sldId="2225"/>
+            <ac:cxnSpMk id="120" creationId="{F8427C67-C6D7-BC46-A3EA-72A3E5CA25EE}"/>
+          </ac:cxnSpMkLst>
+        </pc:cxnChg>
+        <pc:cxnChg chg="mod">
+          <ac:chgData name="Umair Hoodbhoy" userId="9134fddd-ebe0-41b2-9df4-5549cb596a18" providerId="ADAL" clId="{4748566E-7703-B448-B4C4-CCEEE3A860AE}" dt="2021-08-10T17:53:10.470" v="44" actId="1076"/>
+          <ac:cxnSpMkLst>
+            <pc:docMk/>
+            <pc:sldMk cId="2103512187" sldId="2225"/>
+            <ac:cxnSpMk id="121" creationId="{FF06D8CD-3D87-074E-B03E-E231F05FF55F}"/>
+          </ac:cxnSpMkLst>
+        </pc:cxnChg>
+        <pc:cxnChg chg="mod">
+          <ac:chgData name="Umair Hoodbhoy" userId="9134fddd-ebe0-41b2-9df4-5549cb596a18" providerId="ADAL" clId="{4748566E-7703-B448-B4C4-CCEEE3A860AE}" dt="2021-08-10T17:53:10.470" v="44" actId="1076"/>
+          <ac:cxnSpMkLst>
+            <pc:docMk/>
+            <pc:sldMk cId="2103512187" sldId="2225"/>
+            <ac:cxnSpMk id="122" creationId="{C50FEAAD-46B8-704F-B179-1DEDAEE24D28}"/>
+          </ac:cxnSpMkLst>
+        </pc:cxnChg>
+        <pc:cxnChg chg="mod">
+          <ac:chgData name="Umair Hoodbhoy" userId="9134fddd-ebe0-41b2-9df4-5549cb596a18" providerId="ADAL" clId="{4748566E-7703-B448-B4C4-CCEEE3A860AE}" dt="2021-08-10T17:53:10.470" v="44" actId="1076"/>
+          <ac:cxnSpMkLst>
+            <pc:docMk/>
+            <pc:sldMk cId="2103512187" sldId="2225"/>
+            <ac:cxnSpMk id="123" creationId="{C2A5BDED-E809-974F-BA17-2BB4BE03A1FC}"/>
+          </ac:cxnSpMkLst>
+        </pc:cxnChg>
+      </pc:sldChg>
+      <pc:sldChg chg="delSp modSp mod modClrScheme chgLayout">
+        <pc:chgData name="Umair Hoodbhoy" userId="9134fddd-ebe0-41b2-9df4-5549cb596a18" providerId="ADAL" clId="{4748566E-7703-B448-B4C4-CCEEE3A860AE}" dt="2021-08-10T17:54:10.309" v="67" actId="20577"/>
+        <pc:sldMkLst>
+          <pc:docMk/>
+          <pc:sldMk cId="1747856686" sldId="2370"/>
+        </pc:sldMkLst>
+        <pc:spChg chg="mod ord">
+          <ac:chgData name="Umair Hoodbhoy" userId="9134fddd-ebe0-41b2-9df4-5549cb596a18" providerId="ADAL" clId="{4748566E-7703-B448-B4C4-CCEEE3A860AE}" dt="2021-08-10T17:54:10.309" v="67" actId="20577"/>
+          <ac:spMkLst>
+            <pc:docMk/>
+            <pc:sldMk cId="1747856686" sldId="2370"/>
+            <ac:spMk id="2" creationId="{00000000-0000-0000-0000-000000000000}"/>
+          </ac:spMkLst>
+        </pc:spChg>
+        <pc:spChg chg="mod">
+          <ac:chgData name="Umair Hoodbhoy" userId="9134fddd-ebe0-41b2-9df4-5549cb596a18" providerId="ADAL" clId="{4748566E-7703-B448-B4C4-CCEEE3A860AE}" dt="2021-08-10T17:54:03.307" v="61" actId="207"/>
+          <ac:spMkLst>
+            <pc:docMk/>
+            <pc:sldMk cId="1747856686" sldId="2370"/>
+            <ac:spMk id="4" creationId="{32B4D05F-516D-A147-AC64-2D1062BA0EFF}"/>
+          </ac:spMkLst>
+        </pc:spChg>
+        <pc:spChg chg="del">
+          <ac:chgData name="Umair Hoodbhoy" userId="9134fddd-ebe0-41b2-9df4-5549cb596a18" providerId="ADAL" clId="{4748566E-7703-B448-B4C4-CCEEE3A860AE}" dt="2021-08-10T17:53:51.765" v="60" actId="478"/>
+          <ac:spMkLst>
+            <pc:docMk/>
+            <pc:sldMk cId="1747856686" sldId="2370"/>
+            <ac:spMk id="72" creationId="{74449390-30CE-8747-8CE9-EB1A0A1EE862}"/>
+          </ac:spMkLst>
+        </pc:spChg>
+      </pc:sldChg>
+      <pc:sldChg chg="delSp modSp mod modClrScheme chgLayout">
+        <pc:chgData name="Umair Hoodbhoy" userId="9134fddd-ebe0-41b2-9df4-5549cb596a18" providerId="ADAL" clId="{4748566E-7703-B448-B4C4-CCEEE3A860AE}" dt="2021-08-10T17:56:31.361" v="168" actId="478"/>
+        <pc:sldMkLst>
+          <pc:docMk/>
+          <pc:sldMk cId="3912369289" sldId="2373"/>
+        </pc:sldMkLst>
+        <pc:spChg chg="mod ord">
+          <ac:chgData name="Umair Hoodbhoy" userId="9134fddd-ebe0-41b2-9df4-5549cb596a18" providerId="ADAL" clId="{4748566E-7703-B448-B4C4-CCEEE3A860AE}" dt="2021-08-10T17:56:27.676" v="167" actId="6549"/>
+          <ac:spMkLst>
+            <pc:docMk/>
+            <pc:sldMk cId="3912369289" sldId="2373"/>
+            <ac:spMk id="2" creationId="{00000000-0000-0000-0000-000000000000}"/>
+          </ac:spMkLst>
+        </pc:spChg>
+        <pc:spChg chg="del">
+          <ac:chgData name="Umair Hoodbhoy" userId="9134fddd-ebe0-41b2-9df4-5549cb596a18" providerId="ADAL" clId="{4748566E-7703-B448-B4C4-CCEEE3A860AE}" dt="2021-08-10T17:56:31.361" v="168" actId="478"/>
+          <ac:spMkLst>
+            <pc:docMk/>
+            <pc:sldMk cId="3912369289" sldId="2373"/>
+            <ac:spMk id="5" creationId="{AD8E64C9-A686-8747-B08E-76ED41D30F48}"/>
+          </ac:spMkLst>
+        </pc:spChg>
+      </pc:sldChg>
+      <pc:sldChg chg="addSp delSp modSp mod modClrScheme chgLayout">
+        <pc:chgData name="Umair Hoodbhoy" userId="9134fddd-ebe0-41b2-9df4-5549cb596a18" providerId="ADAL" clId="{4748566E-7703-B448-B4C4-CCEEE3A860AE}" dt="2021-08-10T17:55:44.150" v="138" actId="403"/>
+        <pc:sldMkLst>
+          <pc:docMk/>
+          <pc:sldMk cId="2244422166" sldId="2382"/>
+        </pc:sldMkLst>
+        <pc:spChg chg="mod ord">
+          <ac:chgData name="Umair Hoodbhoy" userId="9134fddd-ebe0-41b2-9df4-5549cb596a18" providerId="ADAL" clId="{4748566E-7703-B448-B4C4-CCEEE3A860AE}" dt="2021-08-10T17:54:25.989" v="83" actId="20577"/>
+          <ac:spMkLst>
+            <pc:docMk/>
+            <pc:sldMk cId="2244422166" sldId="2382"/>
+            <ac:spMk id="2" creationId="{00000000-0000-0000-0000-000000000000}"/>
+          </ac:spMkLst>
+        </pc:spChg>
+        <pc:spChg chg="del">
+          <ac:chgData name="Umair Hoodbhoy" userId="9134fddd-ebe0-41b2-9df4-5549cb596a18" providerId="ADAL" clId="{4748566E-7703-B448-B4C4-CCEEE3A860AE}" dt="2021-08-10T17:54:39.319" v="85" actId="478"/>
+          <ac:spMkLst>
+            <pc:docMk/>
+            <pc:sldMk cId="2244422166" sldId="2382"/>
+            <ac:spMk id="3" creationId="{C66BA44C-6125-EF4F-BF54-4E066BC4F671}"/>
+          </ac:spMkLst>
+        </pc:spChg>
+        <pc:spChg chg="add mod ord">
+          <ac:chgData name="Umair Hoodbhoy" userId="9134fddd-ebe0-41b2-9df4-5549cb596a18" providerId="ADAL" clId="{4748566E-7703-B448-B4C4-CCEEE3A860AE}" dt="2021-08-10T17:55:44.150" v="138" actId="403"/>
+          <ac:spMkLst>
+            <pc:docMk/>
+            <pc:sldMk cId="2244422166" sldId="2382"/>
+            <ac:spMk id="4" creationId="{CD435090-19F6-5246-AA7B-E30444111FB4}"/>
+          </ac:spMkLst>
+        </pc:spChg>
+        <pc:spChg chg="del">
+          <ac:chgData name="Umair Hoodbhoy" userId="9134fddd-ebe0-41b2-9df4-5549cb596a18" providerId="ADAL" clId="{4748566E-7703-B448-B4C4-CCEEE3A860AE}" dt="2021-08-10T17:54:29.566" v="84" actId="478"/>
+          <ac:spMkLst>
+            <pc:docMk/>
+            <pc:sldMk cId="2244422166" sldId="2382"/>
+            <ac:spMk id="72" creationId="{74449390-30CE-8747-8CE9-EB1A0A1EE862}"/>
+          </ac:spMkLst>
+        </pc:spChg>
+      </pc:sldChg>
+      <pc:sldChg chg="delSp modSp mod modClrScheme chgLayout">
+        <pc:chgData name="Umair Hoodbhoy" userId="9134fddd-ebe0-41b2-9df4-5549cb596a18" providerId="ADAL" clId="{4748566E-7703-B448-B4C4-CCEEE3A860AE}" dt="2021-08-10T17:56:49.825" v="174"/>
+        <pc:sldMkLst>
+          <pc:docMk/>
+          <pc:sldMk cId="1610562100" sldId="2383"/>
+        </pc:sldMkLst>
+        <pc:spChg chg="mod ord">
+          <ac:chgData name="Umair Hoodbhoy" userId="9134fddd-ebe0-41b2-9df4-5549cb596a18" providerId="ADAL" clId="{4748566E-7703-B448-B4C4-CCEEE3A860AE}" dt="2021-08-10T17:56:49.825" v="174"/>
+          <ac:spMkLst>
+            <pc:docMk/>
+            <pc:sldMk cId="1610562100" sldId="2383"/>
+            <ac:spMk id="2" creationId="{00000000-0000-0000-0000-000000000000}"/>
+          </ac:spMkLst>
+        </pc:spChg>
+        <pc:spChg chg="del mod">
+          <ac:chgData name="Umair Hoodbhoy" userId="9134fddd-ebe0-41b2-9df4-5549cb596a18" providerId="ADAL" clId="{4748566E-7703-B448-B4C4-CCEEE3A860AE}" dt="2021-08-10T17:56:45.273" v="172" actId="478"/>
+          <ac:spMkLst>
+            <pc:docMk/>
+            <pc:sldMk cId="1610562100" sldId="2383"/>
+            <ac:spMk id="72" creationId="{74449390-30CE-8747-8CE9-EB1A0A1EE862}"/>
+          </ac:spMkLst>
+        </pc:spChg>
+      </pc:sldChg>
+      <pc:sldChg chg="modSp add del mod">
+        <pc:chgData name="Umair Hoodbhoy" userId="9134fddd-ebe0-41b2-9df4-5549cb596a18" providerId="ADAL" clId="{4748566E-7703-B448-B4C4-CCEEE3A860AE}" dt="2021-08-10T17:57:43.549" v="198" actId="2696"/>
+        <pc:sldMkLst>
+          <pc:docMk/>
+          <pc:sldMk cId="2201147969" sldId="2384"/>
+        </pc:sldMkLst>
+        <pc:spChg chg="mod">
+          <ac:chgData name="Umair Hoodbhoy" userId="9134fddd-ebe0-41b2-9df4-5549cb596a18" providerId="ADAL" clId="{4748566E-7703-B448-B4C4-CCEEE3A860AE}" dt="2021-08-10T17:52:19.197" v="35" actId="20577"/>
+          <ac:spMkLst>
+            <pc:docMk/>
+            <pc:sldMk cId="2201147969" sldId="2384"/>
+            <ac:spMk id="2" creationId="{9CA63561-8E66-894D-BA2E-15B2F7A193F5}"/>
+          </ac:spMkLst>
+        </pc:spChg>
+        <pc:spChg chg="mod">
+          <ac:chgData name="Umair Hoodbhoy" userId="9134fddd-ebe0-41b2-9df4-5549cb596a18" providerId="ADAL" clId="{4748566E-7703-B448-B4C4-CCEEE3A860AE}" dt="2021-08-10T17:52:09.229" v="28" actId="20577"/>
+          <ac:spMkLst>
+            <pc:docMk/>
+            <pc:sldMk cId="2201147969" sldId="2384"/>
+            <ac:spMk id="3" creationId="{AD53AA04-A301-D44D-8BCD-28A9784BA34E}"/>
+          </ac:spMkLst>
+        </pc:spChg>
+      </pc:sldChg>
+      <pc:sldChg chg="add del">
+        <pc:chgData name="Umair Hoodbhoy" userId="9134fddd-ebe0-41b2-9df4-5549cb596a18" providerId="ADAL" clId="{4748566E-7703-B448-B4C4-CCEEE3A860AE}" dt="2021-08-10T17:51:40.692" v="1"/>
+        <pc:sldMkLst>
+          <pc:docMk/>
+          <pc:sldMk cId="4266748344" sldId="2384"/>
+        </pc:sldMkLst>
+      </pc:sldChg>
+      <pc:sldMasterChg chg="del delSldLayout">
+        <pc:chgData name="Umair Hoodbhoy" userId="9134fddd-ebe0-41b2-9df4-5549cb596a18" providerId="ADAL" clId="{4748566E-7703-B448-B4C4-CCEEE3A860AE}" dt="2021-08-10T17:57:56.365" v="204" actId="2696"/>
+        <pc:sldMasterMkLst>
+          <pc:docMk/>
+          <pc:sldMasterMk cId="3787048019" sldId="2147483691"/>
+        </pc:sldMasterMkLst>
+        <pc:sldLayoutChg chg="del">
+          <pc:chgData name="Umair Hoodbhoy" userId="9134fddd-ebe0-41b2-9df4-5549cb596a18" providerId="ADAL" clId="{4748566E-7703-B448-B4C4-CCEEE3A860AE}" dt="2021-08-10T17:57:56.357" v="200" actId="2696"/>
+          <pc:sldLayoutMkLst>
+            <pc:docMk/>
+            <pc:sldMasterMk cId="3787048019" sldId="2147483691"/>
+            <pc:sldLayoutMk cId="3647867876" sldId="2147483692"/>
+          </pc:sldLayoutMkLst>
+        </pc:sldLayoutChg>
+        <pc:sldLayoutChg chg="del">
+          <pc:chgData name="Umair Hoodbhoy" userId="9134fddd-ebe0-41b2-9df4-5549cb596a18" providerId="ADAL" clId="{4748566E-7703-B448-B4C4-CCEEE3A860AE}" dt="2021-08-10T17:57:56.359" v="201" actId="2696"/>
+          <pc:sldLayoutMkLst>
+            <pc:docMk/>
+            <pc:sldMasterMk cId="3787048019" sldId="2147483691"/>
+            <pc:sldLayoutMk cId="191519106" sldId="2147483693"/>
+          </pc:sldLayoutMkLst>
+        </pc:sldLayoutChg>
+        <pc:sldLayoutChg chg="del">
+          <pc:chgData name="Umair Hoodbhoy" userId="9134fddd-ebe0-41b2-9df4-5549cb596a18" providerId="ADAL" clId="{4748566E-7703-B448-B4C4-CCEEE3A860AE}" dt="2021-08-10T17:57:56.361" v="202" actId="2696"/>
+          <pc:sldLayoutMkLst>
+            <pc:docMk/>
+            <pc:sldMasterMk cId="3787048019" sldId="2147483691"/>
+            <pc:sldLayoutMk cId="1899099703" sldId="2147483711"/>
+          </pc:sldLayoutMkLst>
+        </pc:sldLayoutChg>
+        <pc:sldLayoutChg chg="del">
+          <pc:chgData name="Umair Hoodbhoy" userId="9134fddd-ebe0-41b2-9df4-5549cb596a18" providerId="ADAL" clId="{4748566E-7703-B448-B4C4-CCEEE3A860AE}" dt="2021-08-10T17:57:56.363" v="203" actId="2696"/>
+          <pc:sldLayoutMkLst>
+            <pc:docMk/>
+            <pc:sldMasterMk cId="3787048019" sldId="2147483691"/>
+            <pc:sldLayoutMk cId="2952993144" sldId="2147483717"/>
+          </pc:sldLayoutMkLst>
+        </pc:sldLayoutChg>
+      </pc:sldMasterChg>
+      <pc:sldMasterChg chg="del delSldLayout">
+        <pc:chgData name="Umair Hoodbhoy" userId="9134fddd-ebe0-41b2-9df4-5549cb596a18" providerId="ADAL" clId="{4748566E-7703-B448-B4C4-CCEEE3A860AE}" dt="2021-08-10T17:57:26.105" v="196" actId="2696"/>
+        <pc:sldMasterMkLst>
+          <pc:docMk/>
+          <pc:sldMasterMk cId="1271404269" sldId="2147483694"/>
+        </pc:sldMasterMkLst>
+        <pc:sldLayoutChg chg="del">
+          <pc:chgData name="Umair Hoodbhoy" userId="9134fddd-ebe0-41b2-9df4-5549cb596a18" providerId="ADAL" clId="{4748566E-7703-B448-B4C4-CCEEE3A860AE}" dt="2021-08-10T17:57:26.084" v="185" actId="2696"/>
+          <pc:sldLayoutMkLst>
+            <pc:docMk/>
+            <pc:sldMasterMk cId="1271404269" sldId="2147483694"/>
+            <pc:sldLayoutMk cId="2566878239" sldId="2147483695"/>
+          </pc:sldLayoutMkLst>
+        </pc:sldLayoutChg>
+        <pc:sldLayoutChg chg="del">
+          <pc:chgData name="Umair Hoodbhoy" userId="9134fddd-ebe0-41b2-9df4-5549cb596a18" providerId="ADAL" clId="{4748566E-7703-B448-B4C4-CCEEE3A860AE}" dt="2021-08-10T17:57:26.087" v="186" actId="2696"/>
+          <pc:sldLayoutMkLst>
+            <pc:docMk/>
+            <pc:sldMasterMk cId="1271404269" sldId="2147483694"/>
+            <pc:sldLayoutMk cId="2098115044" sldId="2147483696"/>
+          </pc:sldLayoutMkLst>
+        </pc:sldLayoutChg>
+        <pc:sldLayoutChg chg="del">
+          <pc:chgData name="Umair Hoodbhoy" userId="9134fddd-ebe0-41b2-9df4-5549cb596a18" providerId="ADAL" clId="{4748566E-7703-B448-B4C4-CCEEE3A860AE}" dt="2021-08-10T17:57:26.089" v="187" actId="2696"/>
+          <pc:sldLayoutMkLst>
+            <pc:docMk/>
+            <pc:sldMasterMk cId="1271404269" sldId="2147483694"/>
+            <pc:sldLayoutMk cId="422562148" sldId="2147483697"/>
+          </pc:sldLayoutMkLst>
+        </pc:sldLayoutChg>
+        <pc:sldLayoutChg chg="del">
+          <pc:chgData name="Umair Hoodbhoy" userId="9134fddd-ebe0-41b2-9df4-5549cb596a18" providerId="ADAL" clId="{4748566E-7703-B448-B4C4-CCEEE3A860AE}" dt="2021-08-10T17:57:26.091" v="188" actId="2696"/>
+          <pc:sldLayoutMkLst>
+            <pc:docMk/>
+            <pc:sldMasterMk cId="1271404269" sldId="2147483694"/>
+            <pc:sldLayoutMk cId="3009420838" sldId="2147483698"/>
+          </pc:sldLayoutMkLst>
+        </pc:sldLayoutChg>
+        <pc:sldLayoutChg chg="del">
+          <pc:chgData name="Umair Hoodbhoy" userId="9134fddd-ebe0-41b2-9df4-5549cb596a18" providerId="ADAL" clId="{4748566E-7703-B448-B4C4-CCEEE3A860AE}" dt="2021-08-10T17:57:26.093" v="189" actId="2696"/>
+          <pc:sldLayoutMkLst>
+            <pc:docMk/>
+            <pc:sldMasterMk cId="1271404269" sldId="2147483694"/>
+            <pc:sldLayoutMk cId="908739393" sldId="2147483699"/>
+          </pc:sldLayoutMkLst>
+        </pc:sldLayoutChg>
+        <pc:sldLayoutChg chg="del">
+          <pc:chgData name="Umair Hoodbhoy" userId="9134fddd-ebe0-41b2-9df4-5549cb596a18" providerId="ADAL" clId="{4748566E-7703-B448-B4C4-CCEEE3A860AE}" dt="2021-08-10T17:57:26.095" v="190" actId="2696"/>
+          <pc:sldLayoutMkLst>
+            <pc:docMk/>
+            <pc:sldMasterMk cId="1271404269" sldId="2147483694"/>
+            <pc:sldLayoutMk cId="2682764831" sldId="2147483700"/>
+          </pc:sldLayoutMkLst>
+        </pc:sldLayoutChg>
+        <pc:sldLayoutChg chg="del">
+          <pc:chgData name="Umair Hoodbhoy" userId="9134fddd-ebe0-41b2-9df4-5549cb596a18" providerId="ADAL" clId="{4748566E-7703-B448-B4C4-CCEEE3A860AE}" dt="2021-08-10T17:57:26.096" v="191" actId="2696"/>
+          <pc:sldLayoutMkLst>
+            <pc:docMk/>
+            <pc:sldMasterMk cId="1271404269" sldId="2147483694"/>
+            <pc:sldLayoutMk cId="3100913433" sldId="2147483701"/>
+          </pc:sldLayoutMkLst>
+        </pc:sldLayoutChg>
+        <pc:sldLayoutChg chg="del">
+          <pc:chgData name="Umair Hoodbhoy" userId="9134fddd-ebe0-41b2-9df4-5549cb596a18" providerId="ADAL" clId="{4748566E-7703-B448-B4C4-CCEEE3A860AE}" dt="2021-08-10T17:57:26.098" v="192" actId="2696"/>
+          <pc:sldLayoutMkLst>
+            <pc:docMk/>
+            <pc:sldMasterMk cId="1271404269" sldId="2147483694"/>
+            <pc:sldLayoutMk cId="3445979246" sldId="2147483702"/>
+          </pc:sldLayoutMkLst>
+        </pc:sldLayoutChg>
+        <pc:sldLayoutChg chg="del">
+          <pc:chgData name="Umair Hoodbhoy" userId="9134fddd-ebe0-41b2-9df4-5549cb596a18" providerId="ADAL" clId="{4748566E-7703-B448-B4C4-CCEEE3A860AE}" dt="2021-08-10T17:57:26.099" v="193" actId="2696"/>
+          <pc:sldLayoutMkLst>
+            <pc:docMk/>
+            <pc:sldMasterMk cId="1271404269" sldId="2147483694"/>
+            <pc:sldLayoutMk cId="385845009" sldId="2147483703"/>
+          </pc:sldLayoutMkLst>
+        </pc:sldLayoutChg>
+        <pc:sldLayoutChg chg="del">
+          <pc:chgData name="Umair Hoodbhoy" userId="9134fddd-ebe0-41b2-9df4-5549cb596a18" providerId="ADAL" clId="{4748566E-7703-B448-B4C4-CCEEE3A860AE}" dt="2021-08-10T17:57:26.100" v="194" actId="2696"/>
+          <pc:sldLayoutMkLst>
+            <pc:docMk/>
+            <pc:sldMasterMk cId="1271404269" sldId="2147483694"/>
+            <pc:sldLayoutMk cId="2028473393" sldId="2147483704"/>
+          </pc:sldLayoutMkLst>
+        </pc:sldLayoutChg>
+        <pc:sldLayoutChg chg="del">
+          <pc:chgData name="Umair Hoodbhoy" userId="9134fddd-ebe0-41b2-9df4-5549cb596a18" providerId="ADAL" clId="{4748566E-7703-B448-B4C4-CCEEE3A860AE}" dt="2021-08-10T17:57:26.102" v="195" actId="2696"/>
+          <pc:sldLayoutMkLst>
+            <pc:docMk/>
+            <pc:sldMasterMk cId="1271404269" sldId="2147483694"/>
+            <pc:sldLayoutMk cId="4134816642" sldId="2147483705"/>
+          </pc:sldLayoutMkLst>
+        </pc:sldLayoutChg>
+      </pc:sldMasterChg>
     </pc:docChg>
   </pc:docChgLst>
   <pc:docChgLst>
@@ -3317,7 +3317,7 @@
               <a:rPr lang="en-US" smtClean="0">
                 <a:latin typeface="Gotham Light"/>
               </a:rPr>
-              <a:t>8/9/22</a:t>
+              <a:t>12/20/24</a:t>
             </a:fld>
             <a:endParaRPr lang="en-US" dirty="0">
               <a:latin typeface="Gotham Light"/>
@@ -3496,7 +3496,7 @@
             <a:fld id="{21F0AAEE-9155-2149-B320-0C43E8AE736D}" type="datetimeFigureOut">
               <a:rPr lang="en-US" smtClean="0"/>
               <a:pPr/>
-              <a:t>8/9/22</a:t>
+              <a:t>12/20/24</a:t>
             </a:fld>
             <a:endParaRPr lang="en-US" dirty="0"/>
           </a:p>
@@ -4929,12 +4929,14 @@
         </p:nvSpPr>
         <p:spPr>
           <a:xfrm>
-            <a:off x="742950" y="962025"/>
+            <a:off x="457416" y="606292"/>
             <a:ext cx="8401050" cy="3436938"/>
           </a:xfrm>
         </p:spPr>
         <p:txBody>
-          <a:bodyPr/>
+          <a:bodyPr>
+            <a:normAutofit fontScale="92500"/>
+          </a:bodyPr>
           <a:lstStyle/>
           <a:p>
             <a:r>
@@ -4964,6 +4966,18 @@
             <a:r>
               <a:rPr lang="en-US" dirty="0"/>
               <a:t>Gateway</a:t>
+            </a:r>
+          </a:p>
+          <a:p>
+            <a:endParaRPr lang="en-US" dirty="0"/>
+          </a:p>
+          <a:p>
+            <a:endParaRPr lang="en-US" dirty="0"/>
+          </a:p>
+          <a:p>
+            <a:r>
+              <a:rPr lang="en-US" dirty="0"/>
+              <a:t>Edge</a:t>
             </a:r>
           </a:p>
         </p:txBody>
@@ -4999,7 +5013,7 @@
         </p:blipFill>
         <p:spPr>
           <a:xfrm>
-            <a:off x="964641" y="3608221"/>
+            <a:off x="694774" y="3047099"/>
             <a:ext cx="540000" cy="486000"/>
           </a:xfrm>
           <a:prstGeom prst="rect">
@@ -5029,7 +5043,7 @@
         </p:blipFill>
         <p:spPr>
           <a:xfrm>
-            <a:off x="771570" y="1329430"/>
+            <a:off x="537854" y="860649"/>
             <a:ext cx="966787" cy="749753"/>
           </a:xfrm>
           <a:prstGeom prst="rect">
@@ -5059,7 +5073,7 @@
         </p:blipFill>
         <p:spPr>
           <a:xfrm>
-            <a:off x="818974" y="2507209"/>
+            <a:off x="588170" y="1956367"/>
             <a:ext cx="831335" cy="672986"/>
           </a:xfrm>
           <a:prstGeom prst="rect">
@@ -5127,6 +5141,129 @@
           </a:prstGeom>
         </p:spPr>
       </p:pic>
+      <p:grpSp>
+        <p:nvGrpSpPr>
+          <p:cNvPr id="2" name="Group 1">
+            <a:extLst>
+              <a:ext uri="{FF2B5EF4-FFF2-40B4-BE49-F238E27FC236}">
+                <a16:creationId xmlns:a16="http://schemas.microsoft.com/office/drawing/2014/main" id="{585373EE-2396-FAA7-3DC9-425A4BE2AE8D}"/>
+              </a:ext>
+            </a:extLst>
+          </p:cNvPr>
+          <p:cNvGrpSpPr/>
+          <p:nvPr/>
+        </p:nvGrpSpPr>
+        <p:grpSpPr>
+          <a:xfrm>
+            <a:off x="647738" y="4081418"/>
+            <a:ext cx="634072" cy="486000"/>
+            <a:chOff x="2140113" y="3954624"/>
+            <a:chExt cx="511513" cy="511513"/>
+          </a:xfrm>
+        </p:grpSpPr>
+        <p:sp>
+          <p:nvSpPr>
+            <p:cNvPr id="6" name="Oval 5">
+              <a:extLst>
+                <a:ext uri="{FF2B5EF4-FFF2-40B4-BE49-F238E27FC236}">
+                  <a16:creationId xmlns:a16="http://schemas.microsoft.com/office/drawing/2014/main" id="{C2FC88CB-BBB8-37D9-D99C-87667A80EBF1}"/>
+                </a:ext>
+              </a:extLst>
+            </p:cNvPr>
+            <p:cNvSpPr/>
+            <p:nvPr/>
+          </p:nvSpPr>
+          <p:spPr>
+            <a:xfrm>
+              <a:off x="2140113" y="3954624"/>
+              <a:ext cx="511513" cy="511513"/>
+            </a:xfrm>
+            <a:prstGeom prst="ellipse">
+              <a:avLst/>
+            </a:prstGeom>
+            <a:solidFill>
+              <a:schemeClr val="bg1"/>
+            </a:solidFill>
+            <a:ln>
+              <a:solidFill>
+                <a:schemeClr val="accent1"/>
+              </a:solidFill>
+              <a:prstDash val="dash"/>
+            </a:ln>
+          </p:spPr>
+          <p:style>
+            <a:lnRef idx="2">
+              <a:schemeClr val="accent1">
+                <a:shade val="50000"/>
+              </a:schemeClr>
+            </a:lnRef>
+            <a:fillRef idx="1">
+              <a:schemeClr val="accent1"/>
+            </a:fillRef>
+            <a:effectRef idx="0">
+              <a:schemeClr val="accent1"/>
+            </a:effectRef>
+            <a:fontRef idx="minor">
+              <a:schemeClr val="lt1"/>
+            </a:fontRef>
+          </p:style>
+          <p:txBody>
+            <a:bodyPr rtlCol="0" anchor="ctr"/>
+            <a:lstStyle/>
+            <a:p>
+              <a:pPr algn="ctr"/>
+              <a:endParaRPr lang="en-NZ"/>
+            </a:p>
+          </p:txBody>
+        </p:sp>
+        <p:pic>
+          <p:nvPicPr>
+            <p:cNvPr id="8" name="Graphic 7">
+              <a:extLst>
+                <a:ext uri="{FF2B5EF4-FFF2-40B4-BE49-F238E27FC236}">
+                  <a16:creationId xmlns:a16="http://schemas.microsoft.com/office/drawing/2014/main" id="{9EEF2310-84FF-9160-812C-8F608984479F}"/>
+                </a:ext>
+              </a:extLst>
+            </p:cNvPr>
+            <p:cNvPicPr>
+              <a:picLocks noChangeAspect="1"/>
+            </p:cNvPicPr>
+            <p:nvPr/>
+          </p:nvPicPr>
+          <p:blipFill>
+            <a:blip r:embed="rId3" cstate="screen">
+              <a:extLst>
+                <a:ext uri="{28A0092B-C50C-407E-A947-70E740481C1C}">
+                  <a14:useLocalDpi xmlns:a14="http://schemas.microsoft.com/office/drawing/2010/main"/>
+                </a:ext>
+                <a:ext uri="{96DAC541-7B7A-43D3-8B79-37D633B846F1}">
+                  <asvg:svgBlip xmlns:asvg="http://schemas.microsoft.com/office/drawing/2016/SVG/main" r:embed="rId4"/>
+                </a:ext>
+              </a:extLst>
+            </a:blip>
+            <a:stretch>
+              <a:fillRect/>
+            </a:stretch>
+          </p:blipFill>
+          <p:spPr>
+            <a:xfrm>
+              <a:off x="2193782" y="4008294"/>
+              <a:ext cx="404175" cy="404175"/>
+            </a:xfrm>
+            <a:prstGeom prst="rect">
+              <a:avLst/>
+            </a:prstGeom>
+            <a:effectLst>
+              <a:glow rad="50800">
+                <a:schemeClr val="accent1">
+                  <a:satMod val="175000"/>
+                  <a:alpha val="40000"/>
+                </a:schemeClr>
+              </a:glow>
+            </a:effectLst>
+          </p:spPr>
+        </p:pic>
+      </p:grpSp>
     </p:spTree>
     <p:extLst>
       <p:ext uri="{BB962C8B-B14F-4D97-AF65-F5344CB8AC3E}">
@@ -5149,6 +5286,92 @@
       </p:transition>
     </mc:Fallback>
   </mc:AlternateContent>
+  <p:timing>
+    <p:tnLst>
+      <p:par>
+        <p:cTn id="1" dur="indefinite" restart="never" nodeType="tmRoot">
+          <p:childTnLst>
+            <p:seq concurrent="1" nextAc="seek">
+              <p:cTn id="2" dur="indefinite" nodeType="mainSeq">
+                <p:childTnLst>
+                  <p:par>
+                    <p:cTn id="3" fill="hold">
+                      <p:stCondLst>
+                        <p:cond delay="indefinite"/>
+                        <p:cond evt="onBegin" delay="0">
+                          <p:tn val="2"/>
+                        </p:cond>
+                      </p:stCondLst>
+                      <p:childTnLst>
+                        <p:par>
+                          <p:cTn id="4" fill="hold">
+                            <p:stCondLst>
+                              <p:cond delay="0"/>
+                            </p:stCondLst>
+                            <p:childTnLst>
+                              <p:par>
+                                <p:cTn id="5" presetID="10" presetClass="entr" presetSubtype="0" fill="hold" nodeType="withEffect">
+                                  <p:stCondLst>
+                                    <p:cond delay="0"/>
+                                  </p:stCondLst>
+                                  <p:childTnLst>
+                                    <p:set>
+                                      <p:cBhvr>
+                                        <p:cTn id="6" dur="1" fill="hold">
+                                          <p:stCondLst>
+                                            <p:cond delay="0"/>
+                                          </p:stCondLst>
+                                        </p:cTn>
+                                        <p:tgtEl>
+                                          <p:spTgt spid="2"/>
+                                        </p:tgtEl>
+                                        <p:attrNameLst>
+                                          <p:attrName>style.visibility</p:attrName>
+                                        </p:attrNameLst>
+                                      </p:cBhvr>
+                                      <p:to>
+                                        <p:strVal val="visible"/>
+                                      </p:to>
+                                    </p:set>
+                                    <p:animEffect transition="in" filter="fade">
+                                      <p:cBhvr>
+                                        <p:cTn id="7" dur="500"/>
+                                        <p:tgtEl>
+                                          <p:spTgt spid="2"/>
+                                        </p:tgtEl>
+                                      </p:cBhvr>
+                                    </p:animEffect>
+                                  </p:childTnLst>
+                                </p:cTn>
+                              </p:par>
+                            </p:childTnLst>
+                          </p:cTn>
+                        </p:par>
+                      </p:childTnLst>
+                    </p:cTn>
+                  </p:par>
+                </p:childTnLst>
+              </p:cTn>
+              <p:prevCondLst>
+                <p:cond evt="onPrev" delay="0">
+                  <p:tgtEl>
+                    <p:sldTgt/>
+                  </p:tgtEl>
+                </p:cond>
+              </p:prevCondLst>
+              <p:nextCondLst>
+                <p:cond evt="onNext" delay="0">
+                  <p:tgtEl>
+                    <p:sldTgt/>
+                  </p:tgtEl>
+                </p:cond>
+              </p:nextCondLst>
+            </p:seq>
+          </p:childTnLst>
+        </p:cTn>
+      </p:par>
+    </p:tnLst>
+  </p:timing>
 </p:sld>
 </file>
 
@@ -5935,26 +6158,6 @@
 </file>
 
 <file path=customXml/item1.xml><?xml version="1.0" encoding="utf-8"?>
-<p:properties xmlns:p="http://schemas.microsoft.com/office/2006/metadata/properties" xmlns:xsi="http://www.w3.org/2001/XMLSchema-instance" xmlns:pc="http://schemas.microsoft.com/office/infopath/2007/PartnerControls">
-  <documentManagement>
-    <lcf76f155ced4ddcb4097134ff3c332f xmlns="229b58fe-8f29-4088-a08e-92496f12335c">
-      <Terms xmlns="http://schemas.microsoft.com/office/infopath/2007/PartnerControls"/>
-    </lcf76f155ced4ddcb4097134ff3c332f>
-    <TaxCatchAll xmlns="b9f30590-f0dc-4306-bbda-486557aaeac9" xsi:nil="true"/>
-  </documentManagement>
-</p:properties>
-</file>
-
-<file path=customXml/item2.xml><?xml version="1.0" encoding="utf-8"?>
-<?mso-contentType ?>
-<FormTemplates xmlns="http://schemas.microsoft.com/sharepoint/v3/contenttype/forms">
-  <Display>DocumentLibraryForm</Display>
-  <Edit>DocumentLibraryForm</Edit>
-  <New>DocumentLibraryForm</New>
-</FormTemplates>
-</file>
-
-<file path=customXml/item3.xml><?xml version="1.0" encoding="utf-8"?>
 <ct:contentTypeSchema xmlns:ct="http://schemas.microsoft.com/office/2006/metadata/contentType" xmlns:ma="http://schemas.microsoft.com/office/2006/metadata/properties/metaAttributes" ct:_="" ma:_="" ma:contentTypeName="Document" ma:contentTypeID="0x01010036CBE68FCD3302468ACDF1BBB41F3156" ma:contentTypeVersion="16" ma:contentTypeDescription="Create a new document." ma:contentTypeScope="" ma:versionID="7dae2b2e9596a423c33b50a948b2d729">
   <xsd:schema xmlns:xsd="http://www.w3.org/2001/XMLSchema" xmlns:xs="http://www.w3.org/2001/XMLSchema" xmlns:p="http://schemas.microsoft.com/office/2006/metadata/properties" xmlns:ns2="229b58fe-8f29-4088-a08e-92496f12335c" xmlns:ns3="b9f30590-f0dc-4306-bbda-486557aaeac9" targetNamespace="http://schemas.microsoft.com/office/2006/metadata/properties" ma:root="true" ma:fieldsID="0ca4f89253272070768fa4440b5af07f" ns2:_="" ns3:_="">
     <xsd:import namespace="229b58fe-8f29-4088-a08e-92496f12335c"/>
@@ -6197,32 +6400,27 @@
 </ct:contentTypeSchema>
 </file>
 
-<file path=customXml/itemProps1.xml><?xml version="1.0" encoding="utf-8"?>
-<ds:datastoreItem xmlns:ds="http://schemas.openxmlformats.org/officeDocument/2006/customXml" ds:itemID="{AC9C8711-FFC3-462C-B515-6F5297327B1F}">
-  <ds:schemaRefs>
-    <ds:schemaRef ds:uri="http://schemas.microsoft.com/office/infopath/2007/PartnerControls"/>
-    <ds:schemaRef ds:uri="http://purl.org/dc/terms/"/>
-    <ds:schemaRef ds:uri="229b58fe-8f29-4088-a08e-92496f12335c"/>
-    <ds:schemaRef ds:uri="http://schemas.openxmlformats.org/package/2006/metadata/core-properties"/>
-    <ds:schemaRef ds:uri="http://www.w3.org/XML/1998/namespace"/>
-    <ds:schemaRef ds:uri="http://schemas.microsoft.com/office/2006/metadata/properties"/>
-    <ds:schemaRef ds:uri="http://schemas.microsoft.com/office/2006/documentManagement/types"/>
-    <ds:schemaRef ds:uri="http://purl.org/dc/dcmitype/"/>
-    <ds:schemaRef ds:uri="b9f30590-f0dc-4306-bbda-486557aaeac9"/>
-    <ds:schemaRef ds:uri="http://purl.org/dc/elements/1.1/"/>
-  </ds:schemaRefs>
-</ds:datastoreItem>
+<file path=customXml/item2.xml><?xml version="1.0" encoding="utf-8"?>
+<?mso-contentType ?>
+<FormTemplates xmlns="http://schemas.microsoft.com/sharepoint/v3/contenttype/forms">
+  <Display>DocumentLibraryForm</Display>
+  <Edit>DocumentLibraryForm</Edit>
+  <New>DocumentLibraryForm</New>
+</FormTemplates>
 </file>
 
-<file path=customXml/itemProps2.xml><?xml version="1.0" encoding="utf-8"?>
-<ds:datastoreItem xmlns:ds="http://schemas.openxmlformats.org/officeDocument/2006/customXml" ds:itemID="{FF3F0AAA-1A68-4513-A0E8-38384DBB6A9B}">
-  <ds:schemaRefs>
-    <ds:schemaRef ds:uri="http://schemas.microsoft.com/sharepoint/v3/contenttype/forms"/>
-  </ds:schemaRefs>
-</ds:datastoreItem>
+<file path=customXml/item3.xml><?xml version="1.0" encoding="utf-8"?>
+<p:properties xmlns:p="http://schemas.microsoft.com/office/2006/metadata/properties" xmlns:xsi="http://www.w3.org/2001/XMLSchema-instance" xmlns:pc="http://schemas.microsoft.com/office/infopath/2007/PartnerControls">
+  <documentManagement>
+    <lcf76f155ced4ddcb4097134ff3c332f xmlns="229b58fe-8f29-4088-a08e-92496f12335c">
+      <Terms xmlns="http://schemas.microsoft.com/office/infopath/2007/PartnerControls"/>
+    </lcf76f155ced4ddcb4097134ff3c332f>
+    <TaxCatchAll xmlns="b9f30590-f0dc-4306-bbda-486557aaeac9" xsi:nil="true"/>
+  </documentManagement>
+</p:properties>
 </file>
 
-<file path=customXml/itemProps3.xml><?xml version="1.0" encoding="utf-8"?>
+<file path=customXml/itemProps1.xml><?xml version="1.0" encoding="utf-8"?>
 <ds:datastoreItem xmlns:ds="http://schemas.openxmlformats.org/officeDocument/2006/customXml" ds:itemID="{CB0DF9CF-9558-412E-A0C4-A664E457D637}">
   <ds:schemaRefs>
     <ds:schemaRef ds:uri="http://schemas.microsoft.com/office/2006/metadata/contentType"/>
@@ -6239,4 +6437,29 @@
     <ds:schemaRef ds:uri="http://schemas.microsoft.com/internal/obd"/>
   </ds:schemaRefs>
 </ds:datastoreItem>
+</file>
+
+<file path=customXml/itemProps2.xml><?xml version="1.0" encoding="utf-8"?>
+<ds:datastoreItem xmlns:ds="http://schemas.openxmlformats.org/officeDocument/2006/customXml" ds:itemID="{FF3F0AAA-1A68-4513-A0E8-38384DBB6A9B}">
+  <ds:schemaRefs>
+    <ds:schemaRef ds:uri="http://schemas.microsoft.com/sharepoint/v3/contenttype/forms"/>
+  </ds:schemaRefs>
+</ds:datastoreItem>
+</file>
+
+<file path=customXml/itemProps3.xml><?xml version="1.0" encoding="utf-8"?>
+<ds:datastoreItem xmlns:ds="http://schemas.openxmlformats.org/officeDocument/2006/customXml" ds:itemID="{AC9C8711-FFC3-462C-B515-6F5297327B1F}">
+  <ds:schemaRefs>
+    <ds:schemaRef ds:uri="http://schemas.microsoft.com/office/infopath/2007/PartnerControls"/>
+    <ds:schemaRef ds:uri="http://purl.org/dc/terms/"/>
+    <ds:schemaRef ds:uri="229b58fe-8f29-4088-a08e-92496f12335c"/>
+    <ds:schemaRef ds:uri="http://schemas.openxmlformats.org/package/2006/metadata/core-properties"/>
+    <ds:schemaRef ds:uri="http://www.w3.org/XML/1998/namespace"/>
+    <ds:schemaRef ds:uri="http://schemas.microsoft.com/office/2006/metadata/properties"/>
+    <ds:schemaRef ds:uri="http://schemas.microsoft.com/office/2006/documentManagement/types"/>
+    <ds:schemaRef ds:uri="http://purl.org/dc/dcmitype/"/>
+    <ds:schemaRef ds:uri="b9f30590-f0dc-4306-bbda-486557aaeac9"/>
+    <ds:schemaRef ds:uri="http://purl.org/dc/elements/1.1/"/>
+  </ds:schemaRefs>
+</ds:datastoreItem>
 </file>
</xml_diff>